<commit_message>
Adding Book Summary The Richest Man in Babylon
</commit_message>
<xml_diff>
--- a/Vocabulary/Vocabulary.pptx
+++ b/Vocabulary/Vocabulary.pptx
@@ -10,7 +10,7 @@
     <p:sldId id="257" r:id="rId5"/>
   </p:sldIdLst>
   <p:sldSz cx="10080625" cy="7559675"/>
-  <p:notesSz cx="7559675" cy="10691812"/>
+  <p:notesSz cx="7772400" cy="10058400"/>
 </p:presentation>
 </file>
 
@@ -55,7 +55,7 @@
       </p:grpSpPr>
       <p:sp>
         <p:nvSpPr>
-          <p:cNvPr id="30" name="PlaceHolder 1"/>
+          <p:cNvPr id="24" name="PlaceHolder 1"/>
           <p:cNvSpPr>
             <a:spLocks noGrp="1"/>
           </p:cNvSpPr>
@@ -66,27 +66,25 @@
         <p:spPr>
           <a:xfrm>
             <a:off x="360000" y="360000"/>
-            <a:ext cx="9360000" cy="900000"/>
-          </a:xfrm>
-          <a:prstGeom prst="rect">
-            <a:avLst/>
-          </a:prstGeom>
-        </p:spPr>
-        <p:txBody>
-          <a:bodyPr lIns="0" rIns="0" tIns="0" bIns="0" anchor="b"/>
-          <a:p>
-            <a:endParaRPr b="1" lang="en-US" sz="3200" spc="-1" strike="noStrike">
-              <a:solidFill>
-                <a:srgbClr val="ffffff"/>
-              </a:solidFill>
-              <a:latin typeface="Source Sans Pro Black"/>
-            </a:endParaRPr>
-          </a:p>
-        </p:txBody>
-      </p:sp>
-      <p:sp>
-        <p:nvSpPr>
-          <p:cNvPr id="31" name="PlaceHolder 2"/>
+            <a:ext cx="9359640" cy="899640"/>
+          </a:xfrm>
+          <a:prstGeom prst="rect">
+            <a:avLst/>
+          </a:prstGeom>
+        </p:spPr>
+        <p:txBody>
+          <a:bodyPr lIns="0" rIns="0" tIns="0" bIns="0" anchor="ctr"/>
+          <a:p>
+            <a:pPr algn="ctr"/>
+            <a:endParaRPr b="0" lang="en-US" sz="4400" spc="-1" strike="noStrike">
+              <a:latin typeface="Arial"/>
+            </a:endParaRPr>
+          </a:p>
+        </p:txBody>
+      </p:sp>
+      <p:sp>
+        <p:nvSpPr>
+          <p:cNvPr id="25" name="PlaceHolder 2"/>
           <p:cNvSpPr>
             <a:spLocks noGrp="1"/>
           </p:cNvSpPr>
@@ -97,29 +95,26 @@
         <p:spPr>
           <a:xfrm>
             <a:off x="360000" y="1980000"/>
-            <a:ext cx="9180000" cy="2232000"/>
-          </a:xfrm>
-          <a:prstGeom prst="rect">
-            <a:avLst/>
-          </a:prstGeom>
-        </p:spPr>
-        <p:txBody>
-          <a:bodyPr lIns="0" rIns="0" tIns="0" bIns="0">
-            <a:normAutofit/>
-          </a:bodyPr>
-          <a:p>
-            <a:endParaRPr b="1" lang="en-US" sz="2600" spc="-1" strike="noStrike">
-              <a:solidFill>
-                <a:srgbClr val="1c1c1c"/>
-              </a:solidFill>
-              <a:latin typeface="Source Sans Pro Semibold"/>
-            </a:endParaRPr>
-          </a:p>
-        </p:txBody>
-      </p:sp>
-      <p:sp>
-        <p:nvSpPr>
-          <p:cNvPr id="32" name="PlaceHolder 3"/>
+            <a:ext cx="9179640" cy="2232000"/>
+          </a:xfrm>
+          <a:prstGeom prst="rect">
+            <a:avLst/>
+          </a:prstGeom>
+        </p:spPr>
+        <p:txBody>
+          <a:bodyPr lIns="0" rIns="0" tIns="0" bIns="0">
+            <a:normAutofit/>
+          </a:bodyPr>
+          <a:p>
+            <a:endParaRPr b="0" lang="en-US" sz="3200" spc="-1" strike="noStrike">
+              <a:latin typeface="Arial"/>
+            </a:endParaRPr>
+          </a:p>
+        </p:txBody>
+      </p:sp>
+      <p:sp>
+        <p:nvSpPr>
+          <p:cNvPr id="26" name="PlaceHolder 3"/>
           <p:cNvSpPr>
             <a:spLocks noGrp="1"/>
           </p:cNvSpPr>
@@ -130,22 +125,19 @@
         <p:spPr>
           <a:xfrm>
             <a:off x="360000" y="4424400"/>
-            <a:ext cx="9180000" cy="2232000"/>
-          </a:xfrm>
-          <a:prstGeom prst="rect">
-            <a:avLst/>
-          </a:prstGeom>
-        </p:spPr>
-        <p:txBody>
-          <a:bodyPr lIns="0" rIns="0" tIns="0" bIns="0">
-            <a:normAutofit/>
-          </a:bodyPr>
-          <a:p>
-            <a:endParaRPr b="1" lang="en-US" sz="2600" spc="-1" strike="noStrike">
-              <a:solidFill>
-                <a:srgbClr val="1c1c1c"/>
-              </a:solidFill>
-              <a:latin typeface="Source Sans Pro Semibold"/>
+            <a:ext cx="9179640" cy="2232000"/>
+          </a:xfrm>
+          <a:prstGeom prst="rect">
+            <a:avLst/>
+          </a:prstGeom>
+        </p:spPr>
+        <p:txBody>
+          <a:bodyPr lIns="0" rIns="0" tIns="0" bIns="0">
+            <a:normAutofit/>
+          </a:bodyPr>
+          <a:p>
+            <a:endParaRPr b="0" lang="en-US" sz="3200" spc="-1" strike="noStrike">
+              <a:latin typeface="Arial"/>
             </a:endParaRPr>
           </a:p>
         </p:txBody>
@@ -174,7 +166,7 @@
       </p:grpSpPr>
       <p:sp>
         <p:nvSpPr>
-          <p:cNvPr id="33" name="PlaceHolder 1"/>
+          <p:cNvPr id="27" name="PlaceHolder 1"/>
           <p:cNvSpPr>
             <a:spLocks noGrp="1"/>
           </p:cNvSpPr>
@@ -185,27 +177,25 @@
         <p:spPr>
           <a:xfrm>
             <a:off x="360000" y="360000"/>
-            <a:ext cx="9360000" cy="900000"/>
-          </a:xfrm>
-          <a:prstGeom prst="rect">
-            <a:avLst/>
-          </a:prstGeom>
-        </p:spPr>
-        <p:txBody>
-          <a:bodyPr lIns="0" rIns="0" tIns="0" bIns="0" anchor="b"/>
-          <a:p>
-            <a:endParaRPr b="1" lang="en-US" sz="3200" spc="-1" strike="noStrike">
-              <a:solidFill>
-                <a:srgbClr val="ffffff"/>
-              </a:solidFill>
-              <a:latin typeface="Source Sans Pro Black"/>
-            </a:endParaRPr>
-          </a:p>
-        </p:txBody>
-      </p:sp>
-      <p:sp>
-        <p:nvSpPr>
-          <p:cNvPr id="34" name="PlaceHolder 2"/>
+            <a:ext cx="9359640" cy="899640"/>
+          </a:xfrm>
+          <a:prstGeom prst="rect">
+            <a:avLst/>
+          </a:prstGeom>
+        </p:spPr>
+        <p:txBody>
+          <a:bodyPr lIns="0" rIns="0" tIns="0" bIns="0" anchor="ctr"/>
+          <a:p>
+            <a:pPr algn="ctr"/>
+            <a:endParaRPr b="0" lang="en-US" sz="4400" spc="-1" strike="noStrike">
+              <a:latin typeface="Arial"/>
+            </a:endParaRPr>
+          </a:p>
+        </p:txBody>
+      </p:sp>
+      <p:sp>
+        <p:nvSpPr>
+          <p:cNvPr id="28" name="PlaceHolder 2"/>
           <p:cNvSpPr>
             <a:spLocks noGrp="1"/>
           </p:cNvSpPr>
@@ -227,18 +217,15 @@
             <a:normAutofit/>
           </a:bodyPr>
           <a:p>
-            <a:endParaRPr b="1" lang="en-US" sz="2600" spc="-1" strike="noStrike">
-              <a:solidFill>
-                <a:srgbClr val="1c1c1c"/>
-              </a:solidFill>
-              <a:latin typeface="Source Sans Pro Semibold"/>
-            </a:endParaRPr>
-          </a:p>
-        </p:txBody>
-      </p:sp>
-      <p:sp>
-        <p:nvSpPr>
-          <p:cNvPr id="35" name="PlaceHolder 3"/>
+            <a:endParaRPr b="0" lang="en-US" sz="3200" spc="-1" strike="noStrike">
+              <a:latin typeface="Arial"/>
+            </a:endParaRPr>
+          </a:p>
+        </p:txBody>
+      </p:sp>
+      <p:sp>
+        <p:nvSpPr>
+          <p:cNvPr id="29" name="PlaceHolder 3"/>
           <p:cNvSpPr>
             <a:spLocks noGrp="1"/>
           </p:cNvSpPr>
@@ -260,18 +247,15 @@
             <a:normAutofit/>
           </a:bodyPr>
           <a:p>
-            <a:endParaRPr b="1" lang="en-US" sz="2600" spc="-1" strike="noStrike">
-              <a:solidFill>
-                <a:srgbClr val="1c1c1c"/>
-              </a:solidFill>
-              <a:latin typeface="Source Sans Pro Semibold"/>
-            </a:endParaRPr>
-          </a:p>
-        </p:txBody>
-      </p:sp>
-      <p:sp>
-        <p:nvSpPr>
-          <p:cNvPr id="36" name="PlaceHolder 4"/>
+            <a:endParaRPr b="0" lang="en-US" sz="3200" spc="-1" strike="noStrike">
+              <a:latin typeface="Arial"/>
+            </a:endParaRPr>
+          </a:p>
+        </p:txBody>
+      </p:sp>
+      <p:sp>
+        <p:nvSpPr>
+          <p:cNvPr id="30" name="PlaceHolder 4"/>
           <p:cNvSpPr>
             <a:spLocks noGrp="1"/>
           </p:cNvSpPr>
@@ -293,18 +277,15 @@
             <a:normAutofit/>
           </a:bodyPr>
           <a:p>
-            <a:endParaRPr b="1" lang="en-US" sz="2600" spc="-1" strike="noStrike">
-              <a:solidFill>
-                <a:srgbClr val="1c1c1c"/>
-              </a:solidFill>
-              <a:latin typeface="Source Sans Pro Semibold"/>
-            </a:endParaRPr>
-          </a:p>
-        </p:txBody>
-      </p:sp>
-      <p:sp>
-        <p:nvSpPr>
-          <p:cNvPr id="37" name="PlaceHolder 5"/>
+            <a:endParaRPr b="0" lang="en-US" sz="3200" spc="-1" strike="noStrike">
+              <a:latin typeface="Arial"/>
+            </a:endParaRPr>
+          </a:p>
+        </p:txBody>
+      </p:sp>
+      <p:sp>
+        <p:nvSpPr>
+          <p:cNvPr id="31" name="PlaceHolder 5"/>
           <p:cNvSpPr>
             <a:spLocks noGrp="1"/>
           </p:cNvSpPr>
@@ -326,11 +307,8 @@
             <a:normAutofit/>
           </a:bodyPr>
           <a:p>
-            <a:endParaRPr b="1" lang="en-US" sz="2600" spc="-1" strike="noStrike">
-              <a:solidFill>
-                <a:srgbClr val="1c1c1c"/>
-              </a:solidFill>
-              <a:latin typeface="Source Sans Pro Semibold"/>
+            <a:endParaRPr b="0" lang="en-US" sz="3200" spc="-1" strike="noStrike">
+              <a:latin typeface="Arial"/>
             </a:endParaRPr>
           </a:p>
         </p:txBody>
@@ -359,7 +337,7 @@
       </p:grpSpPr>
       <p:sp>
         <p:nvSpPr>
-          <p:cNvPr id="38" name="PlaceHolder 1"/>
+          <p:cNvPr id="32" name="PlaceHolder 1"/>
           <p:cNvSpPr>
             <a:spLocks noGrp="1"/>
           </p:cNvSpPr>
@@ -370,27 +348,25 @@
         <p:spPr>
           <a:xfrm>
             <a:off x="360000" y="360000"/>
-            <a:ext cx="9360000" cy="900000"/>
-          </a:xfrm>
-          <a:prstGeom prst="rect">
-            <a:avLst/>
-          </a:prstGeom>
-        </p:spPr>
-        <p:txBody>
-          <a:bodyPr lIns="0" rIns="0" tIns="0" bIns="0" anchor="b"/>
-          <a:p>
-            <a:endParaRPr b="1" lang="en-US" sz="3200" spc="-1" strike="noStrike">
-              <a:solidFill>
-                <a:srgbClr val="ffffff"/>
-              </a:solidFill>
-              <a:latin typeface="Source Sans Pro Black"/>
-            </a:endParaRPr>
-          </a:p>
-        </p:txBody>
-      </p:sp>
-      <p:sp>
-        <p:nvSpPr>
-          <p:cNvPr id="39" name="PlaceHolder 2"/>
+            <a:ext cx="9359640" cy="899640"/>
+          </a:xfrm>
+          <a:prstGeom prst="rect">
+            <a:avLst/>
+          </a:prstGeom>
+        </p:spPr>
+        <p:txBody>
+          <a:bodyPr lIns="0" rIns="0" tIns="0" bIns="0" anchor="ctr"/>
+          <a:p>
+            <a:pPr algn="ctr"/>
+            <a:endParaRPr b="0" lang="en-US" sz="4400" spc="-1" strike="noStrike">
+              <a:latin typeface="Arial"/>
+            </a:endParaRPr>
+          </a:p>
+        </p:txBody>
+      </p:sp>
+      <p:sp>
+        <p:nvSpPr>
+          <p:cNvPr id="33" name="PlaceHolder 2"/>
           <p:cNvSpPr>
             <a:spLocks noGrp="1"/>
           </p:cNvSpPr>
@@ -412,18 +388,15 @@
             <a:normAutofit/>
           </a:bodyPr>
           <a:p>
-            <a:endParaRPr b="1" lang="en-US" sz="2600" spc="-1" strike="noStrike">
-              <a:solidFill>
-                <a:srgbClr val="1c1c1c"/>
-              </a:solidFill>
-              <a:latin typeface="Source Sans Pro Semibold"/>
-            </a:endParaRPr>
-          </a:p>
-        </p:txBody>
-      </p:sp>
-      <p:sp>
-        <p:nvSpPr>
-          <p:cNvPr id="40" name="PlaceHolder 3"/>
+            <a:endParaRPr b="0" lang="en-US" sz="3200" spc="-1" strike="noStrike">
+              <a:latin typeface="Arial"/>
+            </a:endParaRPr>
+          </a:p>
+        </p:txBody>
+      </p:sp>
+      <p:sp>
+        <p:nvSpPr>
+          <p:cNvPr id="34" name="PlaceHolder 3"/>
           <p:cNvSpPr>
             <a:spLocks noGrp="1"/>
           </p:cNvSpPr>
@@ -445,18 +418,15 @@
             <a:normAutofit/>
           </a:bodyPr>
           <a:p>
-            <a:endParaRPr b="1" lang="en-US" sz="2600" spc="-1" strike="noStrike">
-              <a:solidFill>
-                <a:srgbClr val="1c1c1c"/>
-              </a:solidFill>
-              <a:latin typeface="Source Sans Pro Semibold"/>
-            </a:endParaRPr>
-          </a:p>
-        </p:txBody>
-      </p:sp>
-      <p:sp>
-        <p:nvSpPr>
-          <p:cNvPr id="41" name="PlaceHolder 4"/>
+            <a:endParaRPr b="0" lang="en-US" sz="3200" spc="-1" strike="noStrike">
+              <a:latin typeface="Arial"/>
+            </a:endParaRPr>
+          </a:p>
+        </p:txBody>
+      </p:sp>
+      <p:sp>
+        <p:nvSpPr>
+          <p:cNvPr id="35" name="PlaceHolder 4"/>
           <p:cNvSpPr>
             <a:spLocks noGrp="1"/>
           </p:cNvSpPr>
@@ -478,18 +448,15 @@
             <a:normAutofit/>
           </a:bodyPr>
           <a:p>
-            <a:endParaRPr b="1" lang="en-US" sz="2600" spc="-1" strike="noStrike">
-              <a:solidFill>
-                <a:srgbClr val="1c1c1c"/>
-              </a:solidFill>
-              <a:latin typeface="Source Sans Pro Semibold"/>
-            </a:endParaRPr>
-          </a:p>
-        </p:txBody>
-      </p:sp>
-      <p:sp>
-        <p:nvSpPr>
-          <p:cNvPr id="42" name="PlaceHolder 5"/>
+            <a:endParaRPr b="0" lang="en-US" sz="3200" spc="-1" strike="noStrike">
+              <a:latin typeface="Arial"/>
+            </a:endParaRPr>
+          </a:p>
+        </p:txBody>
+      </p:sp>
+      <p:sp>
+        <p:nvSpPr>
+          <p:cNvPr id="36" name="PlaceHolder 5"/>
           <p:cNvSpPr>
             <a:spLocks noGrp="1"/>
           </p:cNvSpPr>
@@ -511,18 +478,15 @@
             <a:normAutofit/>
           </a:bodyPr>
           <a:p>
-            <a:endParaRPr b="1" lang="en-US" sz="2600" spc="-1" strike="noStrike">
-              <a:solidFill>
-                <a:srgbClr val="1c1c1c"/>
-              </a:solidFill>
-              <a:latin typeface="Source Sans Pro Semibold"/>
-            </a:endParaRPr>
-          </a:p>
-        </p:txBody>
-      </p:sp>
-      <p:sp>
-        <p:nvSpPr>
-          <p:cNvPr id="43" name="PlaceHolder 6"/>
+            <a:endParaRPr b="0" lang="en-US" sz="3200" spc="-1" strike="noStrike">
+              <a:latin typeface="Arial"/>
+            </a:endParaRPr>
+          </a:p>
+        </p:txBody>
+      </p:sp>
+      <p:sp>
+        <p:nvSpPr>
+          <p:cNvPr id="37" name="PlaceHolder 6"/>
           <p:cNvSpPr>
             <a:spLocks noGrp="1"/>
           </p:cNvSpPr>
@@ -544,18 +508,15 @@
             <a:normAutofit/>
           </a:bodyPr>
           <a:p>
-            <a:endParaRPr b="1" lang="en-US" sz="2600" spc="-1" strike="noStrike">
-              <a:solidFill>
-                <a:srgbClr val="1c1c1c"/>
-              </a:solidFill>
-              <a:latin typeface="Source Sans Pro Semibold"/>
-            </a:endParaRPr>
-          </a:p>
-        </p:txBody>
-      </p:sp>
-      <p:sp>
-        <p:nvSpPr>
-          <p:cNvPr id="44" name="PlaceHolder 7"/>
+            <a:endParaRPr b="0" lang="en-US" sz="3200" spc="-1" strike="noStrike">
+              <a:latin typeface="Arial"/>
+            </a:endParaRPr>
+          </a:p>
+        </p:txBody>
+      </p:sp>
+      <p:sp>
+        <p:nvSpPr>
+          <p:cNvPr id="38" name="PlaceHolder 7"/>
           <p:cNvSpPr>
             <a:spLocks noGrp="1"/>
           </p:cNvSpPr>
@@ -577,11 +538,8 @@
             <a:normAutofit/>
           </a:bodyPr>
           <a:p>
-            <a:endParaRPr b="1" lang="en-US" sz="2600" spc="-1" strike="noStrike">
-              <a:solidFill>
-                <a:srgbClr val="1c1c1c"/>
-              </a:solidFill>
-              <a:latin typeface="Source Sans Pro Semibold"/>
+            <a:endParaRPr b="0" lang="en-US" sz="3200" spc="-1" strike="noStrike">
+              <a:latin typeface="Arial"/>
             </a:endParaRPr>
           </a:p>
         </p:txBody>
@@ -632,7 +590,7 @@
       </p:grpSpPr>
       <p:sp>
         <p:nvSpPr>
-          <p:cNvPr id="51" name="PlaceHolder 1"/>
+          <p:cNvPr id="45" name="PlaceHolder 1"/>
           <p:cNvSpPr>
             <a:spLocks noGrp="1"/>
           </p:cNvSpPr>
@@ -643,27 +601,25 @@
         <p:spPr>
           <a:xfrm>
             <a:off x="360000" y="360000"/>
-            <a:ext cx="9360000" cy="900000"/>
-          </a:xfrm>
-          <a:prstGeom prst="rect">
-            <a:avLst/>
-          </a:prstGeom>
-        </p:spPr>
-        <p:txBody>
-          <a:bodyPr lIns="0" rIns="0" tIns="0" bIns="0" anchor="b"/>
-          <a:p>
-            <a:endParaRPr b="1" lang="en-US" sz="3200" spc="-1" strike="noStrike">
-              <a:solidFill>
-                <a:srgbClr val="ffffff"/>
-              </a:solidFill>
-              <a:latin typeface="Source Sans Pro Black"/>
-            </a:endParaRPr>
-          </a:p>
-        </p:txBody>
-      </p:sp>
-      <p:sp>
-        <p:nvSpPr>
-          <p:cNvPr id="52" name="PlaceHolder 2"/>
+            <a:ext cx="9359640" cy="899640"/>
+          </a:xfrm>
+          <a:prstGeom prst="rect">
+            <a:avLst/>
+          </a:prstGeom>
+        </p:spPr>
+        <p:txBody>
+          <a:bodyPr lIns="0" rIns="0" tIns="0" bIns="0" anchor="ctr"/>
+          <a:p>
+            <a:pPr algn="ctr"/>
+            <a:endParaRPr b="0" lang="en-US" sz="4400" spc="-1" strike="noStrike">
+              <a:latin typeface="Arial"/>
+            </a:endParaRPr>
+          </a:p>
+        </p:txBody>
+      </p:sp>
+      <p:sp>
+        <p:nvSpPr>
+          <p:cNvPr id="46" name="PlaceHolder 2"/>
           <p:cNvSpPr>
             <a:spLocks noGrp="1"/>
           </p:cNvSpPr>
@@ -674,20 +630,18 @@
         <p:spPr>
           <a:xfrm>
             <a:off x="360000" y="1980000"/>
-            <a:ext cx="9180000" cy="4680000"/>
-          </a:xfrm>
-          <a:prstGeom prst="rect">
-            <a:avLst/>
-          </a:prstGeom>
-        </p:spPr>
-        <p:txBody>
-          <a:bodyPr lIns="0" rIns="0" tIns="0" bIns="0"/>
-          <a:p>
-            <a:endParaRPr b="0" lang="en-US" sz="2600" spc="-1" strike="noStrike">
-              <a:solidFill>
-                <a:srgbClr val="1c1c1c"/>
-              </a:solidFill>
-              <a:latin typeface="Source Sans Pro Light"/>
+            <a:ext cx="9179640" cy="4679640"/>
+          </a:xfrm>
+          <a:prstGeom prst="rect">
+            <a:avLst/>
+          </a:prstGeom>
+        </p:spPr>
+        <p:txBody>
+          <a:bodyPr lIns="0" rIns="0" tIns="0" bIns="0" anchor="ctr"/>
+          <a:p>
+            <a:pPr algn="ctr"/>
+            <a:endParaRPr b="0" lang="en-US" sz="3200" spc="-1" strike="noStrike">
+              <a:latin typeface="Arial"/>
             </a:endParaRPr>
           </a:p>
         </p:txBody>
@@ -716,7 +670,7 @@
       </p:grpSpPr>
       <p:sp>
         <p:nvSpPr>
-          <p:cNvPr id="53" name="PlaceHolder 1"/>
+          <p:cNvPr id="47" name="PlaceHolder 1"/>
           <p:cNvSpPr>
             <a:spLocks noGrp="1"/>
           </p:cNvSpPr>
@@ -727,27 +681,25 @@
         <p:spPr>
           <a:xfrm>
             <a:off x="360000" y="360000"/>
-            <a:ext cx="9360000" cy="900000"/>
-          </a:xfrm>
-          <a:prstGeom prst="rect">
-            <a:avLst/>
-          </a:prstGeom>
-        </p:spPr>
-        <p:txBody>
-          <a:bodyPr lIns="0" rIns="0" tIns="0" bIns="0" anchor="b"/>
-          <a:p>
-            <a:endParaRPr b="1" lang="en-US" sz="3200" spc="-1" strike="noStrike">
-              <a:solidFill>
-                <a:srgbClr val="ffffff"/>
-              </a:solidFill>
-              <a:latin typeface="Source Sans Pro Black"/>
-            </a:endParaRPr>
-          </a:p>
-        </p:txBody>
-      </p:sp>
-      <p:sp>
-        <p:nvSpPr>
-          <p:cNvPr id="54" name="PlaceHolder 2"/>
+            <a:ext cx="9359640" cy="899640"/>
+          </a:xfrm>
+          <a:prstGeom prst="rect">
+            <a:avLst/>
+          </a:prstGeom>
+        </p:spPr>
+        <p:txBody>
+          <a:bodyPr lIns="0" rIns="0" tIns="0" bIns="0" anchor="ctr"/>
+          <a:p>
+            <a:pPr algn="ctr"/>
+            <a:endParaRPr b="0" lang="en-US" sz="4400" spc="-1" strike="noStrike">
+              <a:latin typeface="Arial"/>
+            </a:endParaRPr>
+          </a:p>
+        </p:txBody>
+      </p:sp>
+      <p:sp>
+        <p:nvSpPr>
+          <p:cNvPr id="48" name="PlaceHolder 2"/>
           <p:cNvSpPr>
             <a:spLocks noGrp="1"/>
           </p:cNvSpPr>
@@ -758,22 +710,19 @@
         <p:spPr>
           <a:xfrm>
             <a:off x="360000" y="1980000"/>
-            <a:ext cx="9180000" cy="4680000"/>
-          </a:xfrm>
-          <a:prstGeom prst="rect">
-            <a:avLst/>
-          </a:prstGeom>
-        </p:spPr>
-        <p:txBody>
-          <a:bodyPr lIns="0" rIns="0" tIns="0" bIns="0">
-            <a:normAutofit/>
-          </a:bodyPr>
-          <a:p>
-            <a:endParaRPr b="1" lang="en-US" sz="2600" spc="-1" strike="noStrike">
-              <a:solidFill>
-                <a:srgbClr val="1c1c1c"/>
-              </a:solidFill>
-              <a:latin typeface="Source Sans Pro Semibold"/>
+            <a:ext cx="9179640" cy="4679640"/>
+          </a:xfrm>
+          <a:prstGeom prst="rect">
+            <a:avLst/>
+          </a:prstGeom>
+        </p:spPr>
+        <p:txBody>
+          <a:bodyPr lIns="0" rIns="0" tIns="0" bIns="0">
+            <a:normAutofit/>
+          </a:bodyPr>
+          <a:p>
+            <a:endParaRPr b="0" lang="en-US" sz="3200" spc="-1" strike="noStrike">
+              <a:latin typeface="Arial"/>
             </a:endParaRPr>
           </a:p>
         </p:txBody>
@@ -802,7 +751,7 @@
       </p:grpSpPr>
       <p:sp>
         <p:nvSpPr>
-          <p:cNvPr id="55" name="PlaceHolder 1"/>
+          <p:cNvPr id="49" name="PlaceHolder 1"/>
           <p:cNvSpPr>
             <a:spLocks noGrp="1"/>
           </p:cNvSpPr>
@@ -813,27 +762,25 @@
         <p:spPr>
           <a:xfrm>
             <a:off x="360000" y="360000"/>
-            <a:ext cx="9360000" cy="900000"/>
-          </a:xfrm>
-          <a:prstGeom prst="rect">
-            <a:avLst/>
-          </a:prstGeom>
-        </p:spPr>
-        <p:txBody>
-          <a:bodyPr lIns="0" rIns="0" tIns="0" bIns="0" anchor="b"/>
-          <a:p>
-            <a:endParaRPr b="1" lang="en-US" sz="3200" spc="-1" strike="noStrike">
-              <a:solidFill>
-                <a:srgbClr val="ffffff"/>
-              </a:solidFill>
-              <a:latin typeface="Source Sans Pro Black"/>
-            </a:endParaRPr>
-          </a:p>
-        </p:txBody>
-      </p:sp>
-      <p:sp>
-        <p:nvSpPr>
-          <p:cNvPr id="56" name="PlaceHolder 2"/>
+            <a:ext cx="9359640" cy="899640"/>
+          </a:xfrm>
+          <a:prstGeom prst="rect">
+            <a:avLst/>
+          </a:prstGeom>
+        </p:spPr>
+        <p:txBody>
+          <a:bodyPr lIns="0" rIns="0" tIns="0" bIns="0" anchor="ctr"/>
+          <a:p>
+            <a:pPr algn="ctr"/>
+            <a:endParaRPr b="0" lang="en-US" sz="4400" spc="-1" strike="noStrike">
+              <a:latin typeface="Arial"/>
+            </a:endParaRPr>
+          </a:p>
+        </p:txBody>
+      </p:sp>
+      <p:sp>
+        <p:nvSpPr>
+          <p:cNvPr id="50" name="PlaceHolder 2"/>
           <p:cNvSpPr>
             <a:spLocks noGrp="1"/>
           </p:cNvSpPr>
@@ -844,29 +791,26 @@
         <p:spPr>
           <a:xfrm>
             <a:off x="360000" y="1980000"/>
-            <a:ext cx="4479480" cy="4680000"/>
-          </a:xfrm>
-          <a:prstGeom prst="rect">
-            <a:avLst/>
-          </a:prstGeom>
-        </p:spPr>
-        <p:txBody>
-          <a:bodyPr lIns="0" rIns="0" tIns="0" bIns="0">
-            <a:normAutofit/>
-          </a:bodyPr>
-          <a:p>
-            <a:endParaRPr b="1" lang="en-US" sz="2600" spc="-1" strike="noStrike">
-              <a:solidFill>
-                <a:srgbClr val="1c1c1c"/>
-              </a:solidFill>
-              <a:latin typeface="Source Sans Pro Semibold"/>
-            </a:endParaRPr>
-          </a:p>
-        </p:txBody>
-      </p:sp>
-      <p:sp>
-        <p:nvSpPr>
-          <p:cNvPr id="57" name="PlaceHolder 3"/>
+            <a:ext cx="4479480" cy="4679640"/>
+          </a:xfrm>
+          <a:prstGeom prst="rect">
+            <a:avLst/>
+          </a:prstGeom>
+        </p:spPr>
+        <p:txBody>
+          <a:bodyPr lIns="0" rIns="0" tIns="0" bIns="0">
+            <a:normAutofit/>
+          </a:bodyPr>
+          <a:p>
+            <a:endParaRPr b="0" lang="en-US" sz="3200" spc="-1" strike="noStrike">
+              <a:latin typeface="Arial"/>
+            </a:endParaRPr>
+          </a:p>
+        </p:txBody>
+      </p:sp>
+      <p:sp>
+        <p:nvSpPr>
+          <p:cNvPr id="51" name="PlaceHolder 3"/>
           <p:cNvSpPr>
             <a:spLocks noGrp="1"/>
           </p:cNvSpPr>
@@ -877,22 +821,19 @@
         <p:spPr>
           <a:xfrm>
             <a:off x="5063760" y="1980000"/>
-            <a:ext cx="4479480" cy="4680000"/>
-          </a:xfrm>
-          <a:prstGeom prst="rect">
-            <a:avLst/>
-          </a:prstGeom>
-        </p:spPr>
-        <p:txBody>
-          <a:bodyPr lIns="0" rIns="0" tIns="0" bIns="0">
-            <a:normAutofit/>
-          </a:bodyPr>
-          <a:p>
-            <a:endParaRPr b="1" lang="en-US" sz="2600" spc="-1" strike="noStrike">
-              <a:solidFill>
-                <a:srgbClr val="1c1c1c"/>
-              </a:solidFill>
-              <a:latin typeface="Source Sans Pro Semibold"/>
+            <a:ext cx="4479480" cy="4679640"/>
+          </a:xfrm>
+          <a:prstGeom prst="rect">
+            <a:avLst/>
+          </a:prstGeom>
+        </p:spPr>
+        <p:txBody>
+          <a:bodyPr lIns="0" rIns="0" tIns="0" bIns="0">
+            <a:normAutofit/>
+          </a:bodyPr>
+          <a:p>
+            <a:endParaRPr b="0" lang="en-US" sz="3200" spc="-1" strike="noStrike">
+              <a:latin typeface="Arial"/>
             </a:endParaRPr>
           </a:p>
         </p:txBody>
@@ -921,7 +862,7 @@
       </p:grpSpPr>
       <p:sp>
         <p:nvSpPr>
-          <p:cNvPr id="58" name="PlaceHolder 1"/>
+          <p:cNvPr id="52" name="PlaceHolder 1"/>
           <p:cNvSpPr>
             <a:spLocks noGrp="1"/>
           </p:cNvSpPr>
@@ -932,20 +873,18 @@
         <p:spPr>
           <a:xfrm>
             <a:off x="360000" y="360000"/>
-            <a:ext cx="9360000" cy="900000"/>
-          </a:xfrm>
-          <a:prstGeom prst="rect">
-            <a:avLst/>
-          </a:prstGeom>
-        </p:spPr>
-        <p:txBody>
-          <a:bodyPr lIns="0" rIns="0" tIns="0" bIns="0" anchor="b"/>
-          <a:p>
-            <a:endParaRPr b="1" lang="en-US" sz="3200" spc="-1" strike="noStrike">
-              <a:solidFill>
-                <a:srgbClr val="ffffff"/>
-              </a:solidFill>
-              <a:latin typeface="Source Sans Pro Black"/>
+            <a:ext cx="9359640" cy="899640"/>
+          </a:xfrm>
+          <a:prstGeom prst="rect">
+            <a:avLst/>
+          </a:prstGeom>
+        </p:spPr>
+        <p:txBody>
+          <a:bodyPr lIns="0" rIns="0" tIns="0" bIns="0" anchor="ctr"/>
+          <a:p>
+            <a:pPr algn="ctr"/>
+            <a:endParaRPr b="0" lang="en-US" sz="4400" spc="-1" strike="noStrike">
+              <a:latin typeface="Arial"/>
             </a:endParaRPr>
           </a:p>
         </p:txBody>
@@ -974,7 +913,7 @@
       </p:grpSpPr>
       <p:sp>
         <p:nvSpPr>
-          <p:cNvPr id="59" name="PlaceHolder 1"/>
+          <p:cNvPr id="53" name="PlaceHolder 1"/>
           <p:cNvSpPr>
             <a:spLocks noGrp="1"/>
           </p:cNvSpPr>
@@ -985,20 +924,18 @@
         <p:spPr>
           <a:xfrm>
             <a:off x="360000" y="360000"/>
-            <a:ext cx="9360000" cy="4173120"/>
-          </a:xfrm>
-          <a:prstGeom prst="rect">
-            <a:avLst/>
-          </a:prstGeom>
-        </p:spPr>
-        <p:txBody>
-          <a:bodyPr lIns="0" rIns="0" tIns="0" bIns="0"/>
-          <a:p>
-            <a:endParaRPr b="0" lang="en-US" sz="2600" spc="-1" strike="noStrike">
-              <a:solidFill>
-                <a:srgbClr val="1c1c1c"/>
-              </a:solidFill>
-              <a:latin typeface="Source Sans Pro Light"/>
+            <a:ext cx="9359640" cy="4171680"/>
+          </a:xfrm>
+          <a:prstGeom prst="rect">
+            <a:avLst/>
+          </a:prstGeom>
+        </p:spPr>
+        <p:txBody>
+          <a:bodyPr lIns="0" rIns="0" tIns="0" bIns="0" anchor="ctr"/>
+          <a:p>
+            <a:pPr algn="ctr"/>
+            <a:endParaRPr b="0" lang="en-US" sz="3200" spc="-1" strike="noStrike">
+              <a:latin typeface="Arial"/>
             </a:endParaRPr>
           </a:p>
         </p:txBody>
@@ -1027,7 +964,7 @@
       </p:grpSpPr>
       <p:sp>
         <p:nvSpPr>
-          <p:cNvPr id="60" name="PlaceHolder 1"/>
+          <p:cNvPr id="54" name="PlaceHolder 1"/>
           <p:cNvSpPr>
             <a:spLocks noGrp="1"/>
           </p:cNvSpPr>
@@ -1038,27 +975,25 @@
         <p:spPr>
           <a:xfrm>
             <a:off x="360000" y="360000"/>
-            <a:ext cx="9360000" cy="900000"/>
-          </a:xfrm>
-          <a:prstGeom prst="rect">
-            <a:avLst/>
-          </a:prstGeom>
-        </p:spPr>
-        <p:txBody>
-          <a:bodyPr lIns="0" rIns="0" tIns="0" bIns="0" anchor="b"/>
-          <a:p>
-            <a:endParaRPr b="1" lang="en-US" sz="3200" spc="-1" strike="noStrike">
-              <a:solidFill>
-                <a:srgbClr val="ffffff"/>
-              </a:solidFill>
-              <a:latin typeface="Source Sans Pro Black"/>
-            </a:endParaRPr>
-          </a:p>
-        </p:txBody>
-      </p:sp>
-      <p:sp>
-        <p:nvSpPr>
-          <p:cNvPr id="61" name="PlaceHolder 2"/>
+            <a:ext cx="9359640" cy="899640"/>
+          </a:xfrm>
+          <a:prstGeom prst="rect">
+            <a:avLst/>
+          </a:prstGeom>
+        </p:spPr>
+        <p:txBody>
+          <a:bodyPr lIns="0" rIns="0" tIns="0" bIns="0" anchor="ctr"/>
+          <a:p>
+            <a:pPr algn="ctr"/>
+            <a:endParaRPr b="0" lang="en-US" sz="4400" spc="-1" strike="noStrike">
+              <a:latin typeface="Arial"/>
+            </a:endParaRPr>
+          </a:p>
+        </p:txBody>
+      </p:sp>
+      <p:sp>
+        <p:nvSpPr>
+          <p:cNvPr id="55" name="PlaceHolder 2"/>
           <p:cNvSpPr>
             <a:spLocks noGrp="1"/>
           </p:cNvSpPr>
@@ -1080,18 +1015,15 @@
             <a:normAutofit/>
           </a:bodyPr>
           <a:p>
-            <a:endParaRPr b="1" lang="en-US" sz="2600" spc="-1" strike="noStrike">
-              <a:solidFill>
-                <a:srgbClr val="1c1c1c"/>
-              </a:solidFill>
-              <a:latin typeface="Source Sans Pro Semibold"/>
-            </a:endParaRPr>
-          </a:p>
-        </p:txBody>
-      </p:sp>
-      <p:sp>
-        <p:nvSpPr>
-          <p:cNvPr id="62" name="PlaceHolder 3"/>
+            <a:endParaRPr b="0" lang="en-US" sz="3200" spc="-1" strike="noStrike">
+              <a:latin typeface="Arial"/>
+            </a:endParaRPr>
+          </a:p>
+        </p:txBody>
+      </p:sp>
+      <p:sp>
+        <p:nvSpPr>
+          <p:cNvPr id="56" name="PlaceHolder 3"/>
           <p:cNvSpPr>
             <a:spLocks noGrp="1"/>
           </p:cNvSpPr>
@@ -1102,29 +1034,26 @@
         <p:spPr>
           <a:xfrm>
             <a:off x="5063760" y="1980000"/>
-            <a:ext cx="4479480" cy="4680000"/>
-          </a:xfrm>
-          <a:prstGeom prst="rect">
-            <a:avLst/>
-          </a:prstGeom>
-        </p:spPr>
-        <p:txBody>
-          <a:bodyPr lIns="0" rIns="0" tIns="0" bIns="0">
-            <a:normAutofit/>
-          </a:bodyPr>
-          <a:p>
-            <a:endParaRPr b="1" lang="en-US" sz="2600" spc="-1" strike="noStrike">
-              <a:solidFill>
-                <a:srgbClr val="1c1c1c"/>
-              </a:solidFill>
-              <a:latin typeface="Source Sans Pro Semibold"/>
-            </a:endParaRPr>
-          </a:p>
-        </p:txBody>
-      </p:sp>
-      <p:sp>
-        <p:nvSpPr>
-          <p:cNvPr id="63" name="PlaceHolder 4"/>
+            <a:ext cx="4479480" cy="4679640"/>
+          </a:xfrm>
+          <a:prstGeom prst="rect">
+            <a:avLst/>
+          </a:prstGeom>
+        </p:spPr>
+        <p:txBody>
+          <a:bodyPr lIns="0" rIns="0" tIns="0" bIns="0">
+            <a:normAutofit/>
+          </a:bodyPr>
+          <a:p>
+            <a:endParaRPr b="0" lang="en-US" sz="3200" spc="-1" strike="noStrike">
+              <a:latin typeface="Arial"/>
+            </a:endParaRPr>
+          </a:p>
+        </p:txBody>
+      </p:sp>
+      <p:sp>
+        <p:nvSpPr>
+          <p:cNvPr id="57" name="PlaceHolder 4"/>
           <p:cNvSpPr>
             <a:spLocks noGrp="1"/>
           </p:cNvSpPr>
@@ -1146,11 +1075,8 @@
             <a:normAutofit/>
           </a:bodyPr>
           <a:p>
-            <a:endParaRPr b="1" lang="en-US" sz="2600" spc="-1" strike="noStrike">
-              <a:solidFill>
-                <a:srgbClr val="1c1c1c"/>
-              </a:solidFill>
-              <a:latin typeface="Source Sans Pro Semibold"/>
+            <a:endParaRPr b="0" lang="en-US" sz="3200" spc="-1" strike="noStrike">
+              <a:latin typeface="Arial"/>
             </a:endParaRPr>
           </a:p>
         </p:txBody>
@@ -1179,7 +1105,7 @@
       </p:grpSpPr>
       <p:sp>
         <p:nvSpPr>
-          <p:cNvPr id="9" name="PlaceHolder 1"/>
+          <p:cNvPr id="3" name="PlaceHolder 1"/>
           <p:cNvSpPr>
             <a:spLocks noGrp="1"/>
           </p:cNvSpPr>
@@ -1190,27 +1116,25 @@
         <p:spPr>
           <a:xfrm>
             <a:off x="360000" y="360000"/>
-            <a:ext cx="9360000" cy="900000"/>
-          </a:xfrm>
-          <a:prstGeom prst="rect">
-            <a:avLst/>
-          </a:prstGeom>
-        </p:spPr>
-        <p:txBody>
-          <a:bodyPr lIns="0" rIns="0" tIns="0" bIns="0" anchor="b"/>
-          <a:p>
-            <a:endParaRPr b="1" lang="en-US" sz="3200" spc="-1" strike="noStrike">
-              <a:solidFill>
-                <a:srgbClr val="ffffff"/>
-              </a:solidFill>
-              <a:latin typeface="Source Sans Pro Black"/>
-            </a:endParaRPr>
-          </a:p>
-        </p:txBody>
-      </p:sp>
-      <p:sp>
-        <p:nvSpPr>
-          <p:cNvPr id="10" name="PlaceHolder 2"/>
+            <a:ext cx="9359640" cy="899640"/>
+          </a:xfrm>
+          <a:prstGeom prst="rect">
+            <a:avLst/>
+          </a:prstGeom>
+        </p:spPr>
+        <p:txBody>
+          <a:bodyPr lIns="0" rIns="0" tIns="0" bIns="0" anchor="ctr"/>
+          <a:p>
+            <a:pPr algn="ctr"/>
+            <a:endParaRPr b="0" lang="en-US" sz="4400" spc="-1" strike="noStrike">
+              <a:latin typeface="Arial"/>
+            </a:endParaRPr>
+          </a:p>
+        </p:txBody>
+      </p:sp>
+      <p:sp>
+        <p:nvSpPr>
+          <p:cNvPr id="4" name="PlaceHolder 2"/>
           <p:cNvSpPr>
             <a:spLocks noGrp="1"/>
           </p:cNvSpPr>
@@ -1221,20 +1145,18 @@
         <p:spPr>
           <a:xfrm>
             <a:off x="360000" y="1980000"/>
-            <a:ext cx="9180000" cy="4680000"/>
-          </a:xfrm>
-          <a:prstGeom prst="rect">
-            <a:avLst/>
-          </a:prstGeom>
-        </p:spPr>
-        <p:txBody>
-          <a:bodyPr lIns="0" rIns="0" tIns="0" bIns="0"/>
-          <a:p>
-            <a:endParaRPr b="0" lang="en-US" sz="2600" spc="-1" strike="noStrike">
-              <a:solidFill>
-                <a:srgbClr val="1c1c1c"/>
-              </a:solidFill>
-              <a:latin typeface="Source Sans Pro Light"/>
+            <a:ext cx="9179640" cy="4679640"/>
+          </a:xfrm>
+          <a:prstGeom prst="rect">
+            <a:avLst/>
+          </a:prstGeom>
+        </p:spPr>
+        <p:txBody>
+          <a:bodyPr lIns="0" rIns="0" tIns="0" bIns="0" anchor="ctr"/>
+          <a:p>
+            <a:pPr algn="ctr"/>
+            <a:endParaRPr b="0" lang="en-US" sz="3200" spc="-1" strike="noStrike">
+              <a:latin typeface="Arial"/>
             </a:endParaRPr>
           </a:p>
         </p:txBody>
@@ -1263,7 +1185,7 @@
       </p:grpSpPr>
       <p:sp>
         <p:nvSpPr>
-          <p:cNvPr id="64" name="PlaceHolder 1"/>
+          <p:cNvPr id="58" name="PlaceHolder 1"/>
           <p:cNvSpPr>
             <a:spLocks noGrp="1"/>
           </p:cNvSpPr>
@@ -1274,27 +1196,25 @@
         <p:spPr>
           <a:xfrm>
             <a:off x="360000" y="360000"/>
-            <a:ext cx="9360000" cy="900000"/>
-          </a:xfrm>
-          <a:prstGeom prst="rect">
-            <a:avLst/>
-          </a:prstGeom>
-        </p:spPr>
-        <p:txBody>
-          <a:bodyPr lIns="0" rIns="0" tIns="0" bIns="0" anchor="b"/>
-          <a:p>
-            <a:endParaRPr b="1" lang="en-US" sz="3200" spc="-1" strike="noStrike">
-              <a:solidFill>
-                <a:srgbClr val="ffffff"/>
-              </a:solidFill>
-              <a:latin typeface="Source Sans Pro Black"/>
-            </a:endParaRPr>
-          </a:p>
-        </p:txBody>
-      </p:sp>
-      <p:sp>
-        <p:nvSpPr>
-          <p:cNvPr id="65" name="PlaceHolder 2"/>
+            <a:ext cx="9359640" cy="899640"/>
+          </a:xfrm>
+          <a:prstGeom prst="rect">
+            <a:avLst/>
+          </a:prstGeom>
+        </p:spPr>
+        <p:txBody>
+          <a:bodyPr lIns="0" rIns="0" tIns="0" bIns="0" anchor="ctr"/>
+          <a:p>
+            <a:pPr algn="ctr"/>
+            <a:endParaRPr b="0" lang="en-US" sz="4400" spc="-1" strike="noStrike">
+              <a:latin typeface="Arial"/>
+            </a:endParaRPr>
+          </a:p>
+        </p:txBody>
+      </p:sp>
+      <p:sp>
+        <p:nvSpPr>
+          <p:cNvPr id="59" name="PlaceHolder 2"/>
           <p:cNvSpPr>
             <a:spLocks noGrp="1"/>
           </p:cNvSpPr>
@@ -1305,29 +1225,26 @@
         <p:spPr>
           <a:xfrm>
             <a:off x="360000" y="1980000"/>
-            <a:ext cx="4479480" cy="4680000"/>
-          </a:xfrm>
-          <a:prstGeom prst="rect">
-            <a:avLst/>
-          </a:prstGeom>
-        </p:spPr>
-        <p:txBody>
-          <a:bodyPr lIns="0" rIns="0" tIns="0" bIns="0">
-            <a:normAutofit/>
-          </a:bodyPr>
-          <a:p>
-            <a:endParaRPr b="1" lang="en-US" sz="2600" spc="-1" strike="noStrike">
-              <a:solidFill>
-                <a:srgbClr val="1c1c1c"/>
-              </a:solidFill>
-              <a:latin typeface="Source Sans Pro Semibold"/>
-            </a:endParaRPr>
-          </a:p>
-        </p:txBody>
-      </p:sp>
-      <p:sp>
-        <p:nvSpPr>
-          <p:cNvPr id="66" name="PlaceHolder 3"/>
+            <a:ext cx="4479480" cy="4679640"/>
+          </a:xfrm>
+          <a:prstGeom prst="rect">
+            <a:avLst/>
+          </a:prstGeom>
+        </p:spPr>
+        <p:txBody>
+          <a:bodyPr lIns="0" rIns="0" tIns="0" bIns="0">
+            <a:normAutofit/>
+          </a:bodyPr>
+          <a:p>
+            <a:endParaRPr b="0" lang="en-US" sz="3200" spc="-1" strike="noStrike">
+              <a:latin typeface="Arial"/>
+            </a:endParaRPr>
+          </a:p>
+        </p:txBody>
+      </p:sp>
+      <p:sp>
+        <p:nvSpPr>
+          <p:cNvPr id="60" name="PlaceHolder 3"/>
           <p:cNvSpPr>
             <a:spLocks noGrp="1"/>
           </p:cNvSpPr>
@@ -1349,18 +1266,15 @@
             <a:normAutofit/>
           </a:bodyPr>
           <a:p>
-            <a:endParaRPr b="1" lang="en-US" sz="2600" spc="-1" strike="noStrike">
-              <a:solidFill>
-                <a:srgbClr val="1c1c1c"/>
-              </a:solidFill>
-              <a:latin typeface="Source Sans Pro Semibold"/>
-            </a:endParaRPr>
-          </a:p>
-        </p:txBody>
-      </p:sp>
-      <p:sp>
-        <p:nvSpPr>
-          <p:cNvPr id="67" name="PlaceHolder 4"/>
+            <a:endParaRPr b="0" lang="en-US" sz="3200" spc="-1" strike="noStrike">
+              <a:latin typeface="Arial"/>
+            </a:endParaRPr>
+          </a:p>
+        </p:txBody>
+      </p:sp>
+      <p:sp>
+        <p:nvSpPr>
+          <p:cNvPr id="61" name="PlaceHolder 4"/>
           <p:cNvSpPr>
             <a:spLocks noGrp="1"/>
           </p:cNvSpPr>
@@ -1382,11 +1296,8 @@
             <a:normAutofit/>
           </a:bodyPr>
           <a:p>
-            <a:endParaRPr b="1" lang="en-US" sz="2600" spc="-1" strike="noStrike">
-              <a:solidFill>
-                <a:srgbClr val="1c1c1c"/>
-              </a:solidFill>
-              <a:latin typeface="Source Sans Pro Semibold"/>
+            <a:endParaRPr b="0" lang="en-US" sz="3200" spc="-1" strike="noStrike">
+              <a:latin typeface="Arial"/>
             </a:endParaRPr>
           </a:p>
         </p:txBody>
@@ -1415,7 +1326,7 @@
       </p:grpSpPr>
       <p:sp>
         <p:nvSpPr>
-          <p:cNvPr id="68" name="PlaceHolder 1"/>
+          <p:cNvPr id="62" name="PlaceHolder 1"/>
           <p:cNvSpPr>
             <a:spLocks noGrp="1"/>
           </p:cNvSpPr>
@@ -1426,27 +1337,25 @@
         <p:spPr>
           <a:xfrm>
             <a:off x="360000" y="360000"/>
-            <a:ext cx="9360000" cy="900000"/>
-          </a:xfrm>
-          <a:prstGeom prst="rect">
-            <a:avLst/>
-          </a:prstGeom>
-        </p:spPr>
-        <p:txBody>
-          <a:bodyPr lIns="0" rIns="0" tIns="0" bIns="0" anchor="b"/>
-          <a:p>
-            <a:endParaRPr b="1" lang="en-US" sz="3200" spc="-1" strike="noStrike">
-              <a:solidFill>
-                <a:srgbClr val="ffffff"/>
-              </a:solidFill>
-              <a:latin typeface="Source Sans Pro Black"/>
-            </a:endParaRPr>
-          </a:p>
-        </p:txBody>
-      </p:sp>
-      <p:sp>
-        <p:nvSpPr>
-          <p:cNvPr id="69" name="PlaceHolder 2"/>
+            <a:ext cx="9359640" cy="899640"/>
+          </a:xfrm>
+          <a:prstGeom prst="rect">
+            <a:avLst/>
+          </a:prstGeom>
+        </p:spPr>
+        <p:txBody>
+          <a:bodyPr lIns="0" rIns="0" tIns="0" bIns="0" anchor="ctr"/>
+          <a:p>
+            <a:pPr algn="ctr"/>
+            <a:endParaRPr b="0" lang="en-US" sz="4400" spc="-1" strike="noStrike">
+              <a:latin typeface="Arial"/>
+            </a:endParaRPr>
+          </a:p>
+        </p:txBody>
+      </p:sp>
+      <p:sp>
+        <p:nvSpPr>
+          <p:cNvPr id="63" name="PlaceHolder 2"/>
           <p:cNvSpPr>
             <a:spLocks noGrp="1"/>
           </p:cNvSpPr>
@@ -1468,18 +1377,15 @@
             <a:normAutofit/>
           </a:bodyPr>
           <a:p>
-            <a:endParaRPr b="1" lang="en-US" sz="2600" spc="-1" strike="noStrike">
-              <a:solidFill>
-                <a:srgbClr val="1c1c1c"/>
-              </a:solidFill>
-              <a:latin typeface="Source Sans Pro Semibold"/>
-            </a:endParaRPr>
-          </a:p>
-        </p:txBody>
-      </p:sp>
-      <p:sp>
-        <p:nvSpPr>
-          <p:cNvPr id="70" name="PlaceHolder 3"/>
+            <a:endParaRPr b="0" lang="en-US" sz="3200" spc="-1" strike="noStrike">
+              <a:latin typeface="Arial"/>
+            </a:endParaRPr>
+          </a:p>
+        </p:txBody>
+      </p:sp>
+      <p:sp>
+        <p:nvSpPr>
+          <p:cNvPr id="64" name="PlaceHolder 3"/>
           <p:cNvSpPr>
             <a:spLocks noGrp="1"/>
           </p:cNvSpPr>
@@ -1501,18 +1407,15 @@
             <a:normAutofit/>
           </a:bodyPr>
           <a:p>
-            <a:endParaRPr b="1" lang="en-US" sz="2600" spc="-1" strike="noStrike">
-              <a:solidFill>
-                <a:srgbClr val="1c1c1c"/>
-              </a:solidFill>
-              <a:latin typeface="Source Sans Pro Semibold"/>
-            </a:endParaRPr>
-          </a:p>
-        </p:txBody>
-      </p:sp>
-      <p:sp>
-        <p:nvSpPr>
-          <p:cNvPr id="71" name="PlaceHolder 4"/>
+            <a:endParaRPr b="0" lang="en-US" sz="3200" spc="-1" strike="noStrike">
+              <a:latin typeface="Arial"/>
+            </a:endParaRPr>
+          </a:p>
+        </p:txBody>
+      </p:sp>
+      <p:sp>
+        <p:nvSpPr>
+          <p:cNvPr id="65" name="PlaceHolder 4"/>
           <p:cNvSpPr>
             <a:spLocks noGrp="1"/>
           </p:cNvSpPr>
@@ -1523,22 +1426,19 @@
         <p:spPr>
           <a:xfrm>
             <a:off x="360000" y="4424400"/>
-            <a:ext cx="9180000" cy="2232000"/>
-          </a:xfrm>
-          <a:prstGeom prst="rect">
-            <a:avLst/>
-          </a:prstGeom>
-        </p:spPr>
-        <p:txBody>
-          <a:bodyPr lIns="0" rIns="0" tIns="0" bIns="0">
-            <a:normAutofit/>
-          </a:bodyPr>
-          <a:p>
-            <a:endParaRPr b="1" lang="en-US" sz="2600" spc="-1" strike="noStrike">
-              <a:solidFill>
-                <a:srgbClr val="1c1c1c"/>
-              </a:solidFill>
-              <a:latin typeface="Source Sans Pro Semibold"/>
+            <a:ext cx="9179640" cy="2232000"/>
+          </a:xfrm>
+          <a:prstGeom prst="rect">
+            <a:avLst/>
+          </a:prstGeom>
+        </p:spPr>
+        <p:txBody>
+          <a:bodyPr lIns="0" rIns="0" tIns="0" bIns="0">
+            <a:normAutofit/>
+          </a:bodyPr>
+          <a:p>
+            <a:endParaRPr b="0" lang="en-US" sz="3200" spc="-1" strike="noStrike">
+              <a:latin typeface="Arial"/>
             </a:endParaRPr>
           </a:p>
         </p:txBody>
@@ -1567,7 +1467,7 @@
       </p:grpSpPr>
       <p:sp>
         <p:nvSpPr>
-          <p:cNvPr id="72" name="PlaceHolder 1"/>
+          <p:cNvPr id="66" name="PlaceHolder 1"/>
           <p:cNvSpPr>
             <a:spLocks noGrp="1"/>
           </p:cNvSpPr>
@@ -1578,27 +1478,25 @@
         <p:spPr>
           <a:xfrm>
             <a:off x="360000" y="360000"/>
-            <a:ext cx="9360000" cy="900000"/>
-          </a:xfrm>
-          <a:prstGeom prst="rect">
-            <a:avLst/>
-          </a:prstGeom>
-        </p:spPr>
-        <p:txBody>
-          <a:bodyPr lIns="0" rIns="0" tIns="0" bIns="0" anchor="b"/>
-          <a:p>
-            <a:endParaRPr b="1" lang="en-US" sz="3200" spc="-1" strike="noStrike">
-              <a:solidFill>
-                <a:srgbClr val="ffffff"/>
-              </a:solidFill>
-              <a:latin typeface="Source Sans Pro Black"/>
-            </a:endParaRPr>
-          </a:p>
-        </p:txBody>
-      </p:sp>
-      <p:sp>
-        <p:nvSpPr>
-          <p:cNvPr id="73" name="PlaceHolder 2"/>
+            <a:ext cx="9359640" cy="899640"/>
+          </a:xfrm>
+          <a:prstGeom prst="rect">
+            <a:avLst/>
+          </a:prstGeom>
+        </p:spPr>
+        <p:txBody>
+          <a:bodyPr lIns="0" rIns="0" tIns="0" bIns="0" anchor="ctr"/>
+          <a:p>
+            <a:pPr algn="ctr"/>
+            <a:endParaRPr b="0" lang="en-US" sz="4400" spc="-1" strike="noStrike">
+              <a:latin typeface="Arial"/>
+            </a:endParaRPr>
+          </a:p>
+        </p:txBody>
+      </p:sp>
+      <p:sp>
+        <p:nvSpPr>
+          <p:cNvPr id="67" name="PlaceHolder 2"/>
           <p:cNvSpPr>
             <a:spLocks noGrp="1"/>
           </p:cNvSpPr>
@@ -1609,29 +1507,26 @@
         <p:spPr>
           <a:xfrm>
             <a:off x="360000" y="1980000"/>
-            <a:ext cx="9180000" cy="2232000"/>
-          </a:xfrm>
-          <a:prstGeom prst="rect">
-            <a:avLst/>
-          </a:prstGeom>
-        </p:spPr>
-        <p:txBody>
-          <a:bodyPr lIns="0" rIns="0" tIns="0" bIns="0">
-            <a:normAutofit/>
-          </a:bodyPr>
-          <a:p>
-            <a:endParaRPr b="1" lang="en-US" sz="2600" spc="-1" strike="noStrike">
-              <a:solidFill>
-                <a:srgbClr val="1c1c1c"/>
-              </a:solidFill>
-              <a:latin typeface="Source Sans Pro Semibold"/>
-            </a:endParaRPr>
-          </a:p>
-        </p:txBody>
-      </p:sp>
-      <p:sp>
-        <p:nvSpPr>
-          <p:cNvPr id="74" name="PlaceHolder 3"/>
+            <a:ext cx="9179640" cy="2232000"/>
+          </a:xfrm>
+          <a:prstGeom prst="rect">
+            <a:avLst/>
+          </a:prstGeom>
+        </p:spPr>
+        <p:txBody>
+          <a:bodyPr lIns="0" rIns="0" tIns="0" bIns="0">
+            <a:normAutofit/>
+          </a:bodyPr>
+          <a:p>
+            <a:endParaRPr b="0" lang="en-US" sz="3200" spc="-1" strike="noStrike">
+              <a:latin typeface="Arial"/>
+            </a:endParaRPr>
+          </a:p>
+        </p:txBody>
+      </p:sp>
+      <p:sp>
+        <p:nvSpPr>
+          <p:cNvPr id="68" name="PlaceHolder 3"/>
           <p:cNvSpPr>
             <a:spLocks noGrp="1"/>
           </p:cNvSpPr>
@@ -1642,22 +1537,19 @@
         <p:spPr>
           <a:xfrm>
             <a:off x="360000" y="4424400"/>
-            <a:ext cx="9180000" cy="2232000"/>
-          </a:xfrm>
-          <a:prstGeom prst="rect">
-            <a:avLst/>
-          </a:prstGeom>
-        </p:spPr>
-        <p:txBody>
-          <a:bodyPr lIns="0" rIns="0" tIns="0" bIns="0">
-            <a:normAutofit/>
-          </a:bodyPr>
-          <a:p>
-            <a:endParaRPr b="1" lang="en-US" sz="2600" spc="-1" strike="noStrike">
-              <a:solidFill>
-                <a:srgbClr val="1c1c1c"/>
-              </a:solidFill>
-              <a:latin typeface="Source Sans Pro Semibold"/>
+            <a:ext cx="9179640" cy="2232000"/>
+          </a:xfrm>
+          <a:prstGeom prst="rect">
+            <a:avLst/>
+          </a:prstGeom>
+        </p:spPr>
+        <p:txBody>
+          <a:bodyPr lIns="0" rIns="0" tIns="0" bIns="0">
+            <a:normAutofit/>
+          </a:bodyPr>
+          <a:p>
+            <a:endParaRPr b="0" lang="en-US" sz="3200" spc="-1" strike="noStrike">
+              <a:latin typeface="Arial"/>
             </a:endParaRPr>
           </a:p>
         </p:txBody>
@@ -1686,7 +1578,7 @@
       </p:grpSpPr>
       <p:sp>
         <p:nvSpPr>
-          <p:cNvPr id="75" name="PlaceHolder 1"/>
+          <p:cNvPr id="69" name="PlaceHolder 1"/>
           <p:cNvSpPr>
             <a:spLocks noGrp="1"/>
           </p:cNvSpPr>
@@ -1697,27 +1589,25 @@
         <p:spPr>
           <a:xfrm>
             <a:off x="360000" y="360000"/>
-            <a:ext cx="9360000" cy="900000"/>
-          </a:xfrm>
-          <a:prstGeom prst="rect">
-            <a:avLst/>
-          </a:prstGeom>
-        </p:spPr>
-        <p:txBody>
-          <a:bodyPr lIns="0" rIns="0" tIns="0" bIns="0" anchor="b"/>
-          <a:p>
-            <a:endParaRPr b="1" lang="en-US" sz="3200" spc="-1" strike="noStrike">
-              <a:solidFill>
-                <a:srgbClr val="ffffff"/>
-              </a:solidFill>
-              <a:latin typeface="Source Sans Pro Black"/>
-            </a:endParaRPr>
-          </a:p>
-        </p:txBody>
-      </p:sp>
-      <p:sp>
-        <p:nvSpPr>
-          <p:cNvPr id="76" name="PlaceHolder 2"/>
+            <a:ext cx="9359640" cy="899640"/>
+          </a:xfrm>
+          <a:prstGeom prst="rect">
+            <a:avLst/>
+          </a:prstGeom>
+        </p:spPr>
+        <p:txBody>
+          <a:bodyPr lIns="0" rIns="0" tIns="0" bIns="0" anchor="ctr"/>
+          <a:p>
+            <a:pPr algn="ctr"/>
+            <a:endParaRPr b="0" lang="en-US" sz="4400" spc="-1" strike="noStrike">
+              <a:latin typeface="Arial"/>
+            </a:endParaRPr>
+          </a:p>
+        </p:txBody>
+      </p:sp>
+      <p:sp>
+        <p:nvSpPr>
+          <p:cNvPr id="70" name="PlaceHolder 2"/>
           <p:cNvSpPr>
             <a:spLocks noGrp="1"/>
           </p:cNvSpPr>
@@ -1739,18 +1629,15 @@
             <a:normAutofit/>
           </a:bodyPr>
           <a:p>
-            <a:endParaRPr b="1" lang="en-US" sz="2600" spc="-1" strike="noStrike">
-              <a:solidFill>
-                <a:srgbClr val="1c1c1c"/>
-              </a:solidFill>
-              <a:latin typeface="Source Sans Pro Semibold"/>
-            </a:endParaRPr>
-          </a:p>
-        </p:txBody>
-      </p:sp>
-      <p:sp>
-        <p:nvSpPr>
-          <p:cNvPr id="77" name="PlaceHolder 3"/>
+            <a:endParaRPr b="0" lang="en-US" sz="3200" spc="-1" strike="noStrike">
+              <a:latin typeface="Arial"/>
+            </a:endParaRPr>
+          </a:p>
+        </p:txBody>
+      </p:sp>
+      <p:sp>
+        <p:nvSpPr>
+          <p:cNvPr id="71" name="PlaceHolder 3"/>
           <p:cNvSpPr>
             <a:spLocks noGrp="1"/>
           </p:cNvSpPr>
@@ -1772,18 +1659,15 @@
             <a:normAutofit/>
           </a:bodyPr>
           <a:p>
-            <a:endParaRPr b="1" lang="en-US" sz="2600" spc="-1" strike="noStrike">
-              <a:solidFill>
-                <a:srgbClr val="1c1c1c"/>
-              </a:solidFill>
-              <a:latin typeface="Source Sans Pro Semibold"/>
-            </a:endParaRPr>
-          </a:p>
-        </p:txBody>
-      </p:sp>
-      <p:sp>
-        <p:nvSpPr>
-          <p:cNvPr id="78" name="PlaceHolder 4"/>
+            <a:endParaRPr b="0" lang="en-US" sz="3200" spc="-1" strike="noStrike">
+              <a:latin typeface="Arial"/>
+            </a:endParaRPr>
+          </a:p>
+        </p:txBody>
+      </p:sp>
+      <p:sp>
+        <p:nvSpPr>
+          <p:cNvPr id="72" name="PlaceHolder 4"/>
           <p:cNvSpPr>
             <a:spLocks noGrp="1"/>
           </p:cNvSpPr>
@@ -1805,18 +1689,15 @@
             <a:normAutofit/>
           </a:bodyPr>
           <a:p>
-            <a:endParaRPr b="1" lang="en-US" sz="2600" spc="-1" strike="noStrike">
-              <a:solidFill>
-                <a:srgbClr val="1c1c1c"/>
-              </a:solidFill>
-              <a:latin typeface="Source Sans Pro Semibold"/>
-            </a:endParaRPr>
-          </a:p>
-        </p:txBody>
-      </p:sp>
-      <p:sp>
-        <p:nvSpPr>
-          <p:cNvPr id="79" name="PlaceHolder 5"/>
+            <a:endParaRPr b="0" lang="en-US" sz="3200" spc="-1" strike="noStrike">
+              <a:latin typeface="Arial"/>
+            </a:endParaRPr>
+          </a:p>
+        </p:txBody>
+      </p:sp>
+      <p:sp>
+        <p:nvSpPr>
+          <p:cNvPr id="73" name="PlaceHolder 5"/>
           <p:cNvSpPr>
             <a:spLocks noGrp="1"/>
           </p:cNvSpPr>
@@ -1838,11 +1719,8 @@
             <a:normAutofit/>
           </a:bodyPr>
           <a:p>
-            <a:endParaRPr b="1" lang="en-US" sz="2600" spc="-1" strike="noStrike">
-              <a:solidFill>
-                <a:srgbClr val="1c1c1c"/>
-              </a:solidFill>
-              <a:latin typeface="Source Sans Pro Semibold"/>
+            <a:endParaRPr b="0" lang="en-US" sz="3200" spc="-1" strike="noStrike">
+              <a:latin typeface="Arial"/>
             </a:endParaRPr>
           </a:p>
         </p:txBody>
@@ -1871,7 +1749,7 @@
       </p:grpSpPr>
       <p:sp>
         <p:nvSpPr>
-          <p:cNvPr id="80" name="PlaceHolder 1"/>
+          <p:cNvPr id="74" name="PlaceHolder 1"/>
           <p:cNvSpPr>
             <a:spLocks noGrp="1"/>
           </p:cNvSpPr>
@@ -1882,27 +1760,25 @@
         <p:spPr>
           <a:xfrm>
             <a:off x="360000" y="360000"/>
-            <a:ext cx="9360000" cy="900000"/>
-          </a:xfrm>
-          <a:prstGeom prst="rect">
-            <a:avLst/>
-          </a:prstGeom>
-        </p:spPr>
-        <p:txBody>
-          <a:bodyPr lIns="0" rIns="0" tIns="0" bIns="0" anchor="b"/>
-          <a:p>
-            <a:endParaRPr b="1" lang="en-US" sz="3200" spc="-1" strike="noStrike">
-              <a:solidFill>
-                <a:srgbClr val="ffffff"/>
-              </a:solidFill>
-              <a:latin typeface="Source Sans Pro Black"/>
-            </a:endParaRPr>
-          </a:p>
-        </p:txBody>
-      </p:sp>
-      <p:sp>
-        <p:nvSpPr>
-          <p:cNvPr id="81" name="PlaceHolder 2"/>
+            <a:ext cx="9359640" cy="899640"/>
+          </a:xfrm>
+          <a:prstGeom prst="rect">
+            <a:avLst/>
+          </a:prstGeom>
+        </p:spPr>
+        <p:txBody>
+          <a:bodyPr lIns="0" rIns="0" tIns="0" bIns="0" anchor="ctr"/>
+          <a:p>
+            <a:pPr algn="ctr"/>
+            <a:endParaRPr b="0" lang="en-US" sz="4400" spc="-1" strike="noStrike">
+              <a:latin typeface="Arial"/>
+            </a:endParaRPr>
+          </a:p>
+        </p:txBody>
+      </p:sp>
+      <p:sp>
+        <p:nvSpPr>
+          <p:cNvPr id="75" name="PlaceHolder 2"/>
           <p:cNvSpPr>
             <a:spLocks noGrp="1"/>
           </p:cNvSpPr>
@@ -1924,18 +1800,15 @@
             <a:normAutofit/>
           </a:bodyPr>
           <a:p>
-            <a:endParaRPr b="1" lang="en-US" sz="2600" spc="-1" strike="noStrike">
-              <a:solidFill>
-                <a:srgbClr val="1c1c1c"/>
-              </a:solidFill>
-              <a:latin typeface="Source Sans Pro Semibold"/>
-            </a:endParaRPr>
-          </a:p>
-        </p:txBody>
-      </p:sp>
-      <p:sp>
-        <p:nvSpPr>
-          <p:cNvPr id="82" name="PlaceHolder 3"/>
+            <a:endParaRPr b="0" lang="en-US" sz="3200" spc="-1" strike="noStrike">
+              <a:latin typeface="Arial"/>
+            </a:endParaRPr>
+          </a:p>
+        </p:txBody>
+      </p:sp>
+      <p:sp>
+        <p:nvSpPr>
+          <p:cNvPr id="76" name="PlaceHolder 3"/>
           <p:cNvSpPr>
             <a:spLocks noGrp="1"/>
           </p:cNvSpPr>
@@ -1957,18 +1830,15 @@
             <a:normAutofit/>
           </a:bodyPr>
           <a:p>
-            <a:endParaRPr b="1" lang="en-US" sz="2600" spc="-1" strike="noStrike">
-              <a:solidFill>
-                <a:srgbClr val="1c1c1c"/>
-              </a:solidFill>
-              <a:latin typeface="Source Sans Pro Semibold"/>
-            </a:endParaRPr>
-          </a:p>
-        </p:txBody>
-      </p:sp>
-      <p:sp>
-        <p:nvSpPr>
-          <p:cNvPr id="83" name="PlaceHolder 4"/>
+            <a:endParaRPr b="0" lang="en-US" sz="3200" spc="-1" strike="noStrike">
+              <a:latin typeface="Arial"/>
+            </a:endParaRPr>
+          </a:p>
+        </p:txBody>
+      </p:sp>
+      <p:sp>
+        <p:nvSpPr>
+          <p:cNvPr id="77" name="PlaceHolder 4"/>
           <p:cNvSpPr>
             <a:spLocks noGrp="1"/>
           </p:cNvSpPr>
@@ -1990,18 +1860,15 @@
             <a:normAutofit/>
           </a:bodyPr>
           <a:p>
-            <a:endParaRPr b="1" lang="en-US" sz="2600" spc="-1" strike="noStrike">
-              <a:solidFill>
-                <a:srgbClr val="1c1c1c"/>
-              </a:solidFill>
-              <a:latin typeface="Source Sans Pro Semibold"/>
-            </a:endParaRPr>
-          </a:p>
-        </p:txBody>
-      </p:sp>
-      <p:sp>
-        <p:nvSpPr>
-          <p:cNvPr id="84" name="PlaceHolder 5"/>
+            <a:endParaRPr b="0" lang="en-US" sz="3200" spc="-1" strike="noStrike">
+              <a:latin typeface="Arial"/>
+            </a:endParaRPr>
+          </a:p>
+        </p:txBody>
+      </p:sp>
+      <p:sp>
+        <p:nvSpPr>
+          <p:cNvPr id="78" name="PlaceHolder 5"/>
           <p:cNvSpPr>
             <a:spLocks noGrp="1"/>
           </p:cNvSpPr>
@@ -2023,18 +1890,15 @@
             <a:normAutofit/>
           </a:bodyPr>
           <a:p>
-            <a:endParaRPr b="1" lang="en-US" sz="2600" spc="-1" strike="noStrike">
-              <a:solidFill>
-                <a:srgbClr val="1c1c1c"/>
-              </a:solidFill>
-              <a:latin typeface="Source Sans Pro Semibold"/>
-            </a:endParaRPr>
-          </a:p>
-        </p:txBody>
-      </p:sp>
-      <p:sp>
-        <p:nvSpPr>
-          <p:cNvPr id="85" name="PlaceHolder 6"/>
+            <a:endParaRPr b="0" lang="en-US" sz="3200" spc="-1" strike="noStrike">
+              <a:latin typeface="Arial"/>
+            </a:endParaRPr>
+          </a:p>
+        </p:txBody>
+      </p:sp>
+      <p:sp>
+        <p:nvSpPr>
+          <p:cNvPr id="79" name="PlaceHolder 6"/>
           <p:cNvSpPr>
             <a:spLocks noGrp="1"/>
           </p:cNvSpPr>
@@ -2056,18 +1920,15 @@
             <a:normAutofit/>
           </a:bodyPr>
           <a:p>
-            <a:endParaRPr b="1" lang="en-US" sz="2600" spc="-1" strike="noStrike">
-              <a:solidFill>
-                <a:srgbClr val="1c1c1c"/>
-              </a:solidFill>
-              <a:latin typeface="Source Sans Pro Semibold"/>
-            </a:endParaRPr>
-          </a:p>
-        </p:txBody>
-      </p:sp>
-      <p:sp>
-        <p:nvSpPr>
-          <p:cNvPr id="86" name="PlaceHolder 7"/>
+            <a:endParaRPr b="0" lang="en-US" sz="3200" spc="-1" strike="noStrike">
+              <a:latin typeface="Arial"/>
+            </a:endParaRPr>
+          </a:p>
+        </p:txBody>
+      </p:sp>
+      <p:sp>
+        <p:nvSpPr>
+          <p:cNvPr id="80" name="PlaceHolder 7"/>
           <p:cNvSpPr>
             <a:spLocks noGrp="1"/>
           </p:cNvSpPr>
@@ -2089,11 +1950,8 @@
             <a:normAutofit/>
           </a:bodyPr>
           <a:p>
-            <a:endParaRPr b="1" lang="en-US" sz="2600" spc="-1" strike="noStrike">
-              <a:solidFill>
-                <a:srgbClr val="1c1c1c"/>
-              </a:solidFill>
-              <a:latin typeface="Source Sans Pro Semibold"/>
+            <a:endParaRPr b="0" lang="en-US" sz="3200" spc="-1" strike="noStrike">
+              <a:latin typeface="Arial"/>
             </a:endParaRPr>
           </a:p>
         </p:txBody>
@@ -2122,7 +1980,7 @@
       </p:grpSpPr>
       <p:sp>
         <p:nvSpPr>
-          <p:cNvPr id="11" name="PlaceHolder 1"/>
+          <p:cNvPr id="5" name="PlaceHolder 1"/>
           <p:cNvSpPr>
             <a:spLocks noGrp="1"/>
           </p:cNvSpPr>
@@ -2133,27 +1991,25 @@
         <p:spPr>
           <a:xfrm>
             <a:off x="360000" y="360000"/>
-            <a:ext cx="9360000" cy="900000"/>
-          </a:xfrm>
-          <a:prstGeom prst="rect">
-            <a:avLst/>
-          </a:prstGeom>
-        </p:spPr>
-        <p:txBody>
-          <a:bodyPr lIns="0" rIns="0" tIns="0" bIns="0" anchor="b"/>
-          <a:p>
-            <a:endParaRPr b="1" lang="en-US" sz="3200" spc="-1" strike="noStrike">
-              <a:solidFill>
-                <a:srgbClr val="ffffff"/>
-              </a:solidFill>
-              <a:latin typeface="Source Sans Pro Black"/>
-            </a:endParaRPr>
-          </a:p>
-        </p:txBody>
-      </p:sp>
-      <p:sp>
-        <p:nvSpPr>
-          <p:cNvPr id="12" name="PlaceHolder 2"/>
+            <a:ext cx="9359640" cy="899640"/>
+          </a:xfrm>
+          <a:prstGeom prst="rect">
+            <a:avLst/>
+          </a:prstGeom>
+        </p:spPr>
+        <p:txBody>
+          <a:bodyPr lIns="0" rIns="0" tIns="0" bIns="0" anchor="ctr"/>
+          <a:p>
+            <a:pPr algn="ctr"/>
+            <a:endParaRPr b="0" lang="en-US" sz="4400" spc="-1" strike="noStrike">
+              <a:latin typeface="Arial"/>
+            </a:endParaRPr>
+          </a:p>
+        </p:txBody>
+      </p:sp>
+      <p:sp>
+        <p:nvSpPr>
+          <p:cNvPr id="6" name="PlaceHolder 2"/>
           <p:cNvSpPr>
             <a:spLocks noGrp="1"/>
           </p:cNvSpPr>
@@ -2164,22 +2020,19 @@
         <p:spPr>
           <a:xfrm>
             <a:off x="360000" y="1980000"/>
-            <a:ext cx="9180000" cy="4680000"/>
-          </a:xfrm>
-          <a:prstGeom prst="rect">
-            <a:avLst/>
-          </a:prstGeom>
-        </p:spPr>
-        <p:txBody>
-          <a:bodyPr lIns="0" rIns="0" tIns="0" bIns="0">
-            <a:normAutofit/>
-          </a:bodyPr>
-          <a:p>
-            <a:endParaRPr b="1" lang="en-US" sz="2600" spc="-1" strike="noStrike">
-              <a:solidFill>
-                <a:srgbClr val="1c1c1c"/>
-              </a:solidFill>
-              <a:latin typeface="Source Sans Pro Semibold"/>
+            <a:ext cx="9179640" cy="4679640"/>
+          </a:xfrm>
+          <a:prstGeom prst="rect">
+            <a:avLst/>
+          </a:prstGeom>
+        </p:spPr>
+        <p:txBody>
+          <a:bodyPr lIns="0" rIns="0" tIns="0" bIns="0">
+            <a:normAutofit/>
+          </a:bodyPr>
+          <a:p>
+            <a:endParaRPr b="0" lang="en-US" sz="3200" spc="-1" strike="noStrike">
+              <a:latin typeface="Arial"/>
             </a:endParaRPr>
           </a:p>
         </p:txBody>
@@ -2208,7 +2061,7 @@
       </p:grpSpPr>
       <p:sp>
         <p:nvSpPr>
-          <p:cNvPr id="13" name="PlaceHolder 1"/>
+          <p:cNvPr id="7" name="PlaceHolder 1"/>
           <p:cNvSpPr>
             <a:spLocks noGrp="1"/>
           </p:cNvSpPr>
@@ -2219,27 +2072,25 @@
         <p:spPr>
           <a:xfrm>
             <a:off x="360000" y="360000"/>
-            <a:ext cx="9360000" cy="900000"/>
-          </a:xfrm>
-          <a:prstGeom prst="rect">
-            <a:avLst/>
-          </a:prstGeom>
-        </p:spPr>
-        <p:txBody>
-          <a:bodyPr lIns="0" rIns="0" tIns="0" bIns="0" anchor="b"/>
-          <a:p>
-            <a:endParaRPr b="1" lang="en-US" sz="3200" spc="-1" strike="noStrike">
-              <a:solidFill>
-                <a:srgbClr val="ffffff"/>
-              </a:solidFill>
-              <a:latin typeface="Source Sans Pro Black"/>
-            </a:endParaRPr>
-          </a:p>
-        </p:txBody>
-      </p:sp>
-      <p:sp>
-        <p:nvSpPr>
-          <p:cNvPr id="14" name="PlaceHolder 2"/>
+            <a:ext cx="9359640" cy="899640"/>
+          </a:xfrm>
+          <a:prstGeom prst="rect">
+            <a:avLst/>
+          </a:prstGeom>
+        </p:spPr>
+        <p:txBody>
+          <a:bodyPr lIns="0" rIns="0" tIns="0" bIns="0" anchor="ctr"/>
+          <a:p>
+            <a:pPr algn="ctr"/>
+            <a:endParaRPr b="0" lang="en-US" sz="4400" spc="-1" strike="noStrike">
+              <a:latin typeface="Arial"/>
+            </a:endParaRPr>
+          </a:p>
+        </p:txBody>
+      </p:sp>
+      <p:sp>
+        <p:nvSpPr>
+          <p:cNvPr id="8" name="PlaceHolder 2"/>
           <p:cNvSpPr>
             <a:spLocks noGrp="1"/>
           </p:cNvSpPr>
@@ -2250,29 +2101,26 @@
         <p:spPr>
           <a:xfrm>
             <a:off x="360000" y="1980000"/>
-            <a:ext cx="4479480" cy="4680000"/>
-          </a:xfrm>
-          <a:prstGeom prst="rect">
-            <a:avLst/>
-          </a:prstGeom>
-        </p:spPr>
-        <p:txBody>
-          <a:bodyPr lIns="0" rIns="0" tIns="0" bIns="0">
-            <a:normAutofit/>
-          </a:bodyPr>
-          <a:p>
-            <a:endParaRPr b="1" lang="en-US" sz="2600" spc="-1" strike="noStrike">
-              <a:solidFill>
-                <a:srgbClr val="1c1c1c"/>
-              </a:solidFill>
-              <a:latin typeface="Source Sans Pro Semibold"/>
-            </a:endParaRPr>
-          </a:p>
-        </p:txBody>
-      </p:sp>
-      <p:sp>
-        <p:nvSpPr>
-          <p:cNvPr id="15" name="PlaceHolder 3"/>
+            <a:ext cx="4479480" cy="4679640"/>
+          </a:xfrm>
+          <a:prstGeom prst="rect">
+            <a:avLst/>
+          </a:prstGeom>
+        </p:spPr>
+        <p:txBody>
+          <a:bodyPr lIns="0" rIns="0" tIns="0" bIns="0">
+            <a:normAutofit/>
+          </a:bodyPr>
+          <a:p>
+            <a:endParaRPr b="0" lang="en-US" sz="3200" spc="-1" strike="noStrike">
+              <a:latin typeface="Arial"/>
+            </a:endParaRPr>
+          </a:p>
+        </p:txBody>
+      </p:sp>
+      <p:sp>
+        <p:nvSpPr>
+          <p:cNvPr id="9" name="PlaceHolder 3"/>
           <p:cNvSpPr>
             <a:spLocks noGrp="1"/>
           </p:cNvSpPr>
@@ -2283,22 +2131,19 @@
         <p:spPr>
           <a:xfrm>
             <a:off x="5063760" y="1980000"/>
-            <a:ext cx="4479480" cy="4680000"/>
-          </a:xfrm>
-          <a:prstGeom prst="rect">
-            <a:avLst/>
-          </a:prstGeom>
-        </p:spPr>
-        <p:txBody>
-          <a:bodyPr lIns="0" rIns="0" tIns="0" bIns="0">
-            <a:normAutofit/>
-          </a:bodyPr>
-          <a:p>
-            <a:endParaRPr b="1" lang="en-US" sz="2600" spc="-1" strike="noStrike">
-              <a:solidFill>
-                <a:srgbClr val="1c1c1c"/>
-              </a:solidFill>
-              <a:latin typeface="Source Sans Pro Semibold"/>
+            <a:ext cx="4479480" cy="4679640"/>
+          </a:xfrm>
+          <a:prstGeom prst="rect">
+            <a:avLst/>
+          </a:prstGeom>
+        </p:spPr>
+        <p:txBody>
+          <a:bodyPr lIns="0" rIns="0" tIns="0" bIns="0">
+            <a:normAutofit/>
+          </a:bodyPr>
+          <a:p>
+            <a:endParaRPr b="0" lang="en-US" sz="3200" spc="-1" strike="noStrike">
+              <a:latin typeface="Arial"/>
             </a:endParaRPr>
           </a:p>
         </p:txBody>
@@ -2327,7 +2172,7 @@
       </p:grpSpPr>
       <p:sp>
         <p:nvSpPr>
-          <p:cNvPr id="16" name="PlaceHolder 1"/>
+          <p:cNvPr id="10" name="PlaceHolder 1"/>
           <p:cNvSpPr>
             <a:spLocks noGrp="1"/>
           </p:cNvSpPr>
@@ -2338,20 +2183,18 @@
         <p:spPr>
           <a:xfrm>
             <a:off x="360000" y="360000"/>
-            <a:ext cx="9360000" cy="900000"/>
-          </a:xfrm>
-          <a:prstGeom prst="rect">
-            <a:avLst/>
-          </a:prstGeom>
-        </p:spPr>
-        <p:txBody>
-          <a:bodyPr lIns="0" rIns="0" tIns="0" bIns="0" anchor="b"/>
-          <a:p>
-            <a:endParaRPr b="1" lang="en-US" sz="3200" spc="-1" strike="noStrike">
-              <a:solidFill>
-                <a:srgbClr val="ffffff"/>
-              </a:solidFill>
-              <a:latin typeface="Source Sans Pro Black"/>
+            <a:ext cx="9359640" cy="899640"/>
+          </a:xfrm>
+          <a:prstGeom prst="rect">
+            <a:avLst/>
+          </a:prstGeom>
+        </p:spPr>
+        <p:txBody>
+          <a:bodyPr lIns="0" rIns="0" tIns="0" bIns="0" anchor="ctr"/>
+          <a:p>
+            <a:pPr algn="ctr"/>
+            <a:endParaRPr b="0" lang="en-US" sz="4400" spc="-1" strike="noStrike">
+              <a:latin typeface="Arial"/>
             </a:endParaRPr>
           </a:p>
         </p:txBody>
@@ -2380,7 +2223,7 @@
       </p:grpSpPr>
       <p:sp>
         <p:nvSpPr>
-          <p:cNvPr id="17" name="PlaceHolder 1"/>
+          <p:cNvPr id="11" name="PlaceHolder 1"/>
           <p:cNvSpPr>
             <a:spLocks noGrp="1"/>
           </p:cNvSpPr>
@@ -2391,20 +2234,18 @@
         <p:spPr>
           <a:xfrm>
             <a:off x="360000" y="360000"/>
-            <a:ext cx="9360000" cy="4173120"/>
-          </a:xfrm>
-          <a:prstGeom prst="rect">
-            <a:avLst/>
-          </a:prstGeom>
-        </p:spPr>
-        <p:txBody>
-          <a:bodyPr lIns="0" rIns="0" tIns="0" bIns="0"/>
-          <a:p>
-            <a:endParaRPr b="0" lang="en-US" sz="2600" spc="-1" strike="noStrike">
-              <a:solidFill>
-                <a:srgbClr val="1c1c1c"/>
-              </a:solidFill>
-              <a:latin typeface="Source Sans Pro Light"/>
+            <a:ext cx="9359640" cy="4171680"/>
+          </a:xfrm>
+          <a:prstGeom prst="rect">
+            <a:avLst/>
+          </a:prstGeom>
+        </p:spPr>
+        <p:txBody>
+          <a:bodyPr lIns="0" rIns="0" tIns="0" bIns="0" anchor="ctr"/>
+          <a:p>
+            <a:pPr algn="ctr"/>
+            <a:endParaRPr b="0" lang="en-US" sz="3200" spc="-1" strike="noStrike">
+              <a:latin typeface="Arial"/>
             </a:endParaRPr>
           </a:p>
         </p:txBody>
@@ -2433,7 +2274,7 @@
       </p:grpSpPr>
       <p:sp>
         <p:nvSpPr>
-          <p:cNvPr id="18" name="PlaceHolder 1"/>
+          <p:cNvPr id="12" name="PlaceHolder 1"/>
           <p:cNvSpPr>
             <a:spLocks noGrp="1"/>
           </p:cNvSpPr>
@@ -2444,27 +2285,25 @@
         <p:spPr>
           <a:xfrm>
             <a:off x="360000" y="360000"/>
-            <a:ext cx="9360000" cy="900000"/>
-          </a:xfrm>
-          <a:prstGeom prst="rect">
-            <a:avLst/>
-          </a:prstGeom>
-        </p:spPr>
-        <p:txBody>
-          <a:bodyPr lIns="0" rIns="0" tIns="0" bIns="0" anchor="b"/>
-          <a:p>
-            <a:endParaRPr b="1" lang="en-US" sz="3200" spc="-1" strike="noStrike">
-              <a:solidFill>
-                <a:srgbClr val="ffffff"/>
-              </a:solidFill>
-              <a:latin typeface="Source Sans Pro Black"/>
-            </a:endParaRPr>
-          </a:p>
-        </p:txBody>
-      </p:sp>
-      <p:sp>
-        <p:nvSpPr>
-          <p:cNvPr id="19" name="PlaceHolder 2"/>
+            <a:ext cx="9359640" cy="899640"/>
+          </a:xfrm>
+          <a:prstGeom prst="rect">
+            <a:avLst/>
+          </a:prstGeom>
+        </p:spPr>
+        <p:txBody>
+          <a:bodyPr lIns="0" rIns="0" tIns="0" bIns="0" anchor="ctr"/>
+          <a:p>
+            <a:pPr algn="ctr"/>
+            <a:endParaRPr b="0" lang="en-US" sz="4400" spc="-1" strike="noStrike">
+              <a:latin typeface="Arial"/>
+            </a:endParaRPr>
+          </a:p>
+        </p:txBody>
+      </p:sp>
+      <p:sp>
+        <p:nvSpPr>
+          <p:cNvPr id="13" name="PlaceHolder 2"/>
           <p:cNvSpPr>
             <a:spLocks noGrp="1"/>
           </p:cNvSpPr>
@@ -2486,18 +2325,15 @@
             <a:normAutofit/>
           </a:bodyPr>
           <a:p>
-            <a:endParaRPr b="1" lang="en-US" sz="2600" spc="-1" strike="noStrike">
-              <a:solidFill>
-                <a:srgbClr val="1c1c1c"/>
-              </a:solidFill>
-              <a:latin typeface="Source Sans Pro Semibold"/>
-            </a:endParaRPr>
-          </a:p>
-        </p:txBody>
-      </p:sp>
-      <p:sp>
-        <p:nvSpPr>
-          <p:cNvPr id="20" name="PlaceHolder 3"/>
+            <a:endParaRPr b="0" lang="en-US" sz="3200" spc="-1" strike="noStrike">
+              <a:latin typeface="Arial"/>
+            </a:endParaRPr>
+          </a:p>
+        </p:txBody>
+      </p:sp>
+      <p:sp>
+        <p:nvSpPr>
+          <p:cNvPr id="14" name="PlaceHolder 3"/>
           <p:cNvSpPr>
             <a:spLocks noGrp="1"/>
           </p:cNvSpPr>
@@ -2508,29 +2344,26 @@
         <p:spPr>
           <a:xfrm>
             <a:off x="5063760" y="1980000"/>
-            <a:ext cx="4479480" cy="4680000"/>
-          </a:xfrm>
-          <a:prstGeom prst="rect">
-            <a:avLst/>
-          </a:prstGeom>
-        </p:spPr>
-        <p:txBody>
-          <a:bodyPr lIns="0" rIns="0" tIns="0" bIns="0">
-            <a:normAutofit/>
-          </a:bodyPr>
-          <a:p>
-            <a:endParaRPr b="1" lang="en-US" sz="2600" spc="-1" strike="noStrike">
-              <a:solidFill>
-                <a:srgbClr val="1c1c1c"/>
-              </a:solidFill>
-              <a:latin typeface="Source Sans Pro Semibold"/>
-            </a:endParaRPr>
-          </a:p>
-        </p:txBody>
-      </p:sp>
-      <p:sp>
-        <p:nvSpPr>
-          <p:cNvPr id="21" name="PlaceHolder 4"/>
+            <a:ext cx="4479480" cy="4679640"/>
+          </a:xfrm>
+          <a:prstGeom prst="rect">
+            <a:avLst/>
+          </a:prstGeom>
+        </p:spPr>
+        <p:txBody>
+          <a:bodyPr lIns="0" rIns="0" tIns="0" bIns="0">
+            <a:normAutofit/>
+          </a:bodyPr>
+          <a:p>
+            <a:endParaRPr b="0" lang="en-US" sz="3200" spc="-1" strike="noStrike">
+              <a:latin typeface="Arial"/>
+            </a:endParaRPr>
+          </a:p>
+        </p:txBody>
+      </p:sp>
+      <p:sp>
+        <p:nvSpPr>
+          <p:cNvPr id="15" name="PlaceHolder 4"/>
           <p:cNvSpPr>
             <a:spLocks noGrp="1"/>
           </p:cNvSpPr>
@@ -2552,11 +2385,8 @@
             <a:normAutofit/>
           </a:bodyPr>
           <a:p>
-            <a:endParaRPr b="1" lang="en-US" sz="2600" spc="-1" strike="noStrike">
-              <a:solidFill>
-                <a:srgbClr val="1c1c1c"/>
-              </a:solidFill>
-              <a:latin typeface="Source Sans Pro Semibold"/>
+            <a:endParaRPr b="0" lang="en-US" sz="3200" spc="-1" strike="noStrike">
+              <a:latin typeface="Arial"/>
             </a:endParaRPr>
           </a:p>
         </p:txBody>
@@ -2585,7 +2415,7 @@
       </p:grpSpPr>
       <p:sp>
         <p:nvSpPr>
-          <p:cNvPr id="22" name="PlaceHolder 1"/>
+          <p:cNvPr id="16" name="PlaceHolder 1"/>
           <p:cNvSpPr>
             <a:spLocks noGrp="1"/>
           </p:cNvSpPr>
@@ -2596,27 +2426,25 @@
         <p:spPr>
           <a:xfrm>
             <a:off x="360000" y="360000"/>
-            <a:ext cx="9360000" cy="900000"/>
-          </a:xfrm>
-          <a:prstGeom prst="rect">
-            <a:avLst/>
-          </a:prstGeom>
-        </p:spPr>
-        <p:txBody>
-          <a:bodyPr lIns="0" rIns="0" tIns="0" bIns="0" anchor="b"/>
-          <a:p>
-            <a:endParaRPr b="1" lang="en-US" sz="3200" spc="-1" strike="noStrike">
-              <a:solidFill>
-                <a:srgbClr val="ffffff"/>
-              </a:solidFill>
-              <a:latin typeface="Source Sans Pro Black"/>
-            </a:endParaRPr>
-          </a:p>
-        </p:txBody>
-      </p:sp>
-      <p:sp>
-        <p:nvSpPr>
-          <p:cNvPr id="23" name="PlaceHolder 2"/>
+            <a:ext cx="9359640" cy="899640"/>
+          </a:xfrm>
+          <a:prstGeom prst="rect">
+            <a:avLst/>
+          </a:prstGeom>
+        </p:spPr>
+        <p:txBody>
+          <a:bodyPr lIns="0" rIns="0" tIns="0" bIns="0" anchor="ctr"/>
+          <a:p>
+            <a:pPr algn="ctr"/>
+            <a:endParaRPr b="0" lang="en-US" sz="4400" spc="-1" strike="noStrike">
+              <a:latin typeface="Arial"/>
+            </a:endParaRPr>
+          </a:p>
+        </p:txBody>
+      </p:sp>
+      <p:sp>
+        <p:nvSpPr>
+          <p:cNvPr id="17" name="PlaceHolder 2"/>
           <p:cNvSpPr>
             <a:spLocks noGrp="1"/>
           </p:cNvSpPr>
@@ -2627,29 +2455,26 @@
         <p:spPr>
           <a:xfrm>
             <a:off x="360000" y="1980000"/>
-            <a:ext cx="4479480" cy="4680000"/>
-          </a:xfrm>
-          <a:prstGeom prst="rect">
-            <a:avLst/>
-          </a:prstGeom>
-        </p:spPr>
-        <p:txBody>
-          <a:bodyPr lIns="0" rIns="0" tIns="0" bIns="0">
-            <a:normAutofit/>
-          </a:bodyPr>
-          <a:p>
-            <a:endParaRPr b="1" lang="en-US" sz="2600" spc="-1" strike="noStrike">
-              <a:solidFill>
-                <a:srgbClr val="1c1c1c"/>
-              </a:solidFill>
-              <a:latin typeface="Source Sans Pro Semibold"/>
-            </a:endParaRPr>
-          </a:p>
-        </p:txBody>
-      </p:sp>
-      <p:sp>
-        <p:nvSpPr>
-          <p:cNvPr id="24" name="PlaceHolder 3"/>
+            <a:ext cx="4479480" cy="4679640"/>
+          </a:xfrm>
+          <a:prstGeom prst="rect">
+            <a:avLst/>
+          </a:prstGeom>
+        </p:spPr>
+        <p:txBody>
+          <a:bodyPr lIns="0" rIns="0" tIns="0" bIns="0">
+            <a:normAutofit/>
+          </a:bodyPr>
+          <a:p>
+            <a:endParaRPr b="0" lang="en-US" sz="3200" spc="-1" strike="noStrike">
+              <a:latin typeface="Arial"/>
+            </a:endParaRPr>
+          </a:p>
+        </p:txBody>
+      </p:sp>
+      <p:sp>
+        <p:nvSpPr>
+          <p:cNvPr id="18" name="PlaceHolder 3"/>
           <p:cNvSpPr>
             <a:spLocks noGrp="1"/>
           </p:cNvSpPr>
@@ -2671,18 +2496,15 @@
             <a:normAutofit/>
           </a:bodyPr>
           <a:p>
-            <a:endParaRPr b="1" lang="en-US" sz="2600" spc="-1" strike="noStrike">
-              <a:solidFill>
-                <a:srgbClr val="1c1c1c"/>
-              </a:solidFill>
-              <a:latin typeface="Source Sans Pro Semibold"/>
-            </a:endParaRPr>
-          </a:p>
-        </p:txBody>
-      </p:sp>
-      <p:sp>
-        <p:nvSpPr>
-          <p:cNvPr id="25" name="PlaceHolder 4"/>
+            <a:endParaRPr b="0" lang="en-US" sz="3200" spc="-1" strike="noStrike">
+              <a:latin typeface="Arial"/>
+            </a:endParaRPr>
+          </a:p>
+        </p:txBody>
+      </p:sp>
+      <p:sp>
+        <p:nvSpPr>
+          <p:cNvPr id="19" name="PlaceHolder 4"/>
           <p:cNvSpPr>
             <a:spLocks noGrp="1"/>
           </p:cNvSpPr>
@@ -2704,11 +2526,8 @@
             <a:normAutofit/>
           </a:bodyPr>
           <a:p>
-            <a:endParaRPr b="1" lang="en-US" sz="2600" spc="-1" strike="noStrike">
-              <a:solidFill>
-                <a:srgbClr val="1c1c1c"/>
-              </a:solidFill>
-              <a:latin typeface="Source Sans Pro Semibold"/>
+            <a:endParaRPr b="0" lang="en-US" sz="3200" spc="-1" strike="noStrike">
+              <a:latin typeface="Arial"/>
             </a:endParaRPr>
           </a:p>
         </p:txBody>
@@ -2737,7 +2556,7 @@
       </p:grpSpPr>
       <p:sp>
         <p:nvSpPr>
-          <p:cNvPr id="26" name="PlaceHolder 1"/>
+          <p:cNvPr id="20" name="PlaceHolder 1"/>
           <p:cNvSpPr>
             <a:spLocks noGrp="1"/>
           </p:cNvSpPr>
@@ -2748,27 +2567,25 @@
         <p:spPr>
           <a:xfrm>
             <a:off x="360000" y="360000"/>
-            <a:ext cx="9360000" cy="900000"/>
-          </a:xfrm>
-          <a:prstGeom prst="rect">
-            <a:avLst/>
-          </a:prstGeom>
-        </p:spPr>
-        <p:txBody>
-          <a:bodyPr lIns="0" rIns="0" tIns="0" bIns="0" anchor="b"/>
-          <a:p>
-            <a:endParaRPr b="1" lang="en-US" sz="3200" spc="-1" strike="noStrike">
-              <a:solidFill>
-                <a:srgbClr val="ffffff"/>
-              </a:solidFill>
-              <a:latin typeface="Source Sans Pro Black"/>
-            </a:endParaRPr>
-          </a:p>
-        </p:txBody>
-      </p:sp>
-      <p:sp>
-        <p:nvSpPr>
-          <p:cNvPr id="27" name="PlaceHolder 2"/>
+            <a:ext cx="9359640" cy="899640"/>
+          </a:xfrm>
+          <a:prstGeom prst="rect">
+            <a:avLst/>
+          </a:prstGeom>
+        </p:spPr>
+        <p:txBody>
+          <a:bodyPr lIns="0" rIns="0" tIns="0" bIns="0" anchor="ctr"/>
+          <a:p>
+            <a:pPr algn="ctr"/>
+            <a:endParaRPr b="0" lang="en-US" sz="4400" spc="-1" strike="noStrike">
+              <a:latin typeface="Arial"/>
+            </a:endParaRPr>
+          </a:p>
+        </p:txBody>
+      </p:sp>
+      <p:sp>
+        <p:nvSpPr>
+          <p:cNvPr id="21" name="PlaceHolder 2"/>
           <p:cNvSpPr>
             <a:spLocks noGrp="1"/>
           </p:cNvSpPr>
@@ -2790,18 +2607,15 @@
             <a:normAutofit/>
           </a:bodyPr>
           <a:p>
-            <a:endParaRPr b="1" lang="en-US" sz="2600" spc="-1" strike="noStrike">
-              <a:solidFill>
-                <a:srgbClr val="1c1c1c"/>
-              </a:solidFill>
-              <a:latin typeface="Source Sans Pro Semibold"/>
-            </a:endParaRPr>
-          </a:p>
-        </p:txBody>
-      </p:sp>
-      <p:sp>
-        <p:nvSpPr>
-          <p:cNvPr id="28" name="PlaceHolder 3"/>
+            <a:endParaRPr b="0" lang="en-US" sz="3200" spc="-1" strike="noStrike">
+              <a:latin typeface="Arial"/>
+            </a:endParaRPr>
+          </a:p>
+        </p:txBody>
+      </p:sp>
+      <p:sp>
+        <p:nvSpPr>
+          <p:cNvPr id="22" name="PlaceHolder 3"/>
           <p:cNvSpPr>
             <a:spLocks noGrp="1"/>
           </p:cNvSpPr>
@@ -2823,18 +2637,15 @@
             <a:normAutofit/>
           </a:bodyPr>
           <a:p>
-            <a:endParaRPr b="1" lang="en-US" sz="2600" spc="-1" strike="noStrike">
-              <a:solidFill>
-                <a:srgbClr val="1c1c1c"/>
-              </a:solidFill>
-              <a:latin typeface="Source Sans Pro Semibold"/>
-            </a:endParaRPr>
-          </a:p>
-        </p:txBody>
-      </p:sp>
-      <p:sp>
-        <p:nvSpPr>
-          <p:cNvPr id="29" name="PlaceHolder 4"/>
+            <a:endParaRPr b="0" lang="en-US" sz="3200" spc="-1" strike="noStrike">
+              <a:latin typeface="Arial"/>
+            </a:endParaRPr>
+          </a:p>
+        </p:txBody>
+      </p:sp>
+      <p:sp>
+        <p:nvSpPr>
+          <p:cNvPr id="23" name="PlaceHolder 4"/>
           <p:cNvSpPr>
             <a:spLocks noGrp="1"/>
           </p:cNvSpPr>
@@ -2845,22 +2656,19 @@
         <p:spPr>
           <a:xfrm>
             <a:off x="360000" y="4424400"/>
-            <a:ext cx="9180000" cy="2232000"/>
-          </a:xfrm>
-          <a:prstGeom prst="rect">
-            <a:avLst/>
-          </a:prstGeom>
-        </p:spPr>
-        <p:txBody>
-          <a:bodyPr lIns="0" rIns="0" tIns="0" bIns="0">
-            <a:normAutofit/>
-          </a:bodyPr>
-          <a:p>
-            <a:endParaRPr b="1" lang="en-US" sz="2600" spc="-1" strike="noStrike">
-              <a:solidFill>
-                <a:srgbClr val="1c1c1c"/>
-              </a:solidFill>
-              <a:latin typeface="Source Sans Pro Semibold"/>
+            <a:ext cx="9179640" cy="2232000"/>
+          </a:xfrm>
+          <a:prstGeom prst="rect">
+            <a:avLst/>
+          </a:prstGeom>
+        </p:spPr>
+        <p:txBody>
+          <a:bodyPr lIns="0" rIns="0" tIns="0" bIns="0">
+            <a:normAutofit/>
+          </a:bodyPr>
+          <a:p>
+            <a:endParaRPr b="0" lang="en-US" sz="3200" spc="-1" strike="noStrike">
+              <a:latin typeface="Arial"/>
             </a:endParaRPr>
           </a:p>
         </p:txBody>
@@ -2895,8 +2703,8 @@
         </p:nvSpPr>
         <p:spPr>
           <a:xfrm>
-            <a:off x="0" y="180000"/>
-            <a:ext cx="9720000" cy="1260000"/>
+            <a:off x="0" y="3150000"/>
+            <a:ext cx="9719640" cy="1259640"/>
           </a:xfrm>
           <a:prstGeom prst="rect">
             <a:avLst/>
@@ -2904,7 +2712,7 @@
           <a:solidFill>
             <a:srgbClr val="e74c3c"/>
           </a:solidFill>
-          <a:ln w="72000">
+          <a:ln>
             <a:noFill/>
           </a:ln>
         </p:spPr>
@@ -2917,89 +2725,7 @@
       </p:sp>
       <p:sp>
         <p:nvSpPr>
-          <p:cNvPr id="1" name="CustomShape 2"/>
-          <p:cNvSpPr/>
-          <p:nvPr/>
-        </p:nvSpPr>
-        <p:spPr>
-          <a:xfrm>
-            <a:off x="7560000" y="6840000"/>
-            <a:ext cx="2520000" cy="540000"/>
-          </a:xfrm>
-          <a:prstGeom prst="rect">
-            <a:avLst/>
-          </a:prstGeom>
-          <a:solidFill>
-            <a:srgbClr val="e74c3c"/>
-          </a:solidFill>
-          <a:ln w="72000">
-            <a:noFill/>
-          </a:ln>
-        </p:spPr>
-        <p:style>
-          <a:lnRef idx="0"/>
-          <a:fillRef idx="0"/>
-          <a:effectRef idx="0"/>
-          <a:fontRef idx="minor"/>
-        </p:style>
-      </p:sp>
-      <p:sp>
-        <p:nvSpPr>
-          <p:cNvPr id="2" name="CustomShape 3"/>
-          <p:cNvSpPr/>
-          <p:nvPr/>
-        </p:nvSpPr>
-        <p:spPr>
-          <a:xfrm>
-            <a:off x="900000" y="6840000"/>
-            <a:ext cx="6480000" cy="540000"/>
-          </a:xfrm>
-          <a:prstGeom prst="rect">
-            <a:avLst/>
-          </a:prstGeom>
-          <a:solidFill>
-            <a:srgbClr val="bdc3c7"/>
-          </a:solidFill>
-          <a:ln w="72000">
-            <a:noFill/>
-          </a:ln>
-        </p:spPr>
-        <p:style>
-          <a:lnRef idx="0"/>
-          <a:fillRef idx="0"/>
-          <a:effectRef idx="0"/>
-          <a:fontRef idx="minor"/>
-        </p:style>
-      </p:sp>
-      <p:sp>
-        <p:nvSpPr>
-          <p:cNvPr id="3" name="CustomShape 4"/>
-          <p:cNvSpPr/>
-          <p:nvPr/>
-        </p:nvSpPr>
-        <p:spPr>
-          <a:xfrm>
-            <a:off x="180000" y="6840000"/>
-            <a:ext cx="540000" cy="540000"/>
-          </a:xfrm>
-          <a:prstGeom prst="rect">
-            <a:avLst/>
-          </a:prstGeom>
-          <a:noFill/>
-          <a:ln w="72000">
-            <a:noFill/>
-          </a:ln>
-        </p:spPr>
-        <p:style>
-          <a:lnRef idx="0"/>
-          <a:fillRef idx="0"/>
-          <a:effectRef idx="0"/>
-          <a:fontRef idx="minor"/>
-        </p:style>
-      </p:sp>
-      <p:sp>
-        <p:nvSpPr>
-          <p:cNvPr id="4" name="PlaceHolder 5"/>
+          <p:cNvPr id="1" name="PlaceHolder 2"/>
           <p:cNvSpPr>
             <a:spLocks noGrp="1"/>
           </p:cNvSpPr>
@@ -3010,7 +2736,7 @@
         <p:spPr>
           <a:xfrm>
             <a:off x="360000" y="360000"/>
-            <a:ext cx="9360000" cy="900000"/>
+            <a:ext cx="9359640" cy="899640"/>
           </a:xfrm>
           <a:prstGeom prst="rect">
             <a:avLst/>
@@ -3020,348 +2746,192 @@
           <a:bodyPr lIns="0" rIns="0" tIns="0" bIns="0" anchor="b"/>
           <a:p>
             <a:r>
-              <a:rPr b="1" lang="en-US" sz="3200" spc="-1" strike="noStrike">
-                <a:solidFill>
-                  <a:srgbClr val="ffffff"/>
-                </a:solidFill>
-                <a:latin typeface="Source Sans Pro Black"/>
+              <a:rPr b="0" lang="en-US" sz="1800" spc="-1" strike="noStrike">
+                <a:latin typeface="Arial"/>
               </a:rPr>
-              <a:t>Click to </a:t>
+              <a:t>Click to edit the title text format</a:t>
             </a:r>
-            <a:r>
-              <a:rPr b="1" lang="en-US" sz="3200" spc="-1" strike="noStrike">
-                <a:solidFill>
-                  <a:srgbClr val="ffffff"/>
-                </a:solidFill>
-                <a:latin typeface="Source Sans Pro Black"/>
-              </a:rPr>
-              <a:t>edit the </a:t>
-            </a:r>
-            <a:r>
-              <a:rPr b="1" lang="en-US" sz="3200" spc="-1" strike="noStrike">
-                <a:solidFill>
-                  <a:srgbClr val="ffffff"/>
-                </a:solidFill>
-                <a:latin typeface="Source Sans Pro Black"/>
-              </a:rPr>
-              <a:t>title text </a:t>
-            </a:r>
-            <a:r>
-              <a:rPr b="1" lang="en-US" sz="3200" spc="-1" strike="noStrike">
-                <a:solidFill>
-                  <a:srgbClr val="ffffff"/>
-                </a:solidFill>
-                <a:latin typeface="Source Sans Pro Black"/>
-              </a:rPr>
-              <a:t>format</a:t>
-            </a:r>
-            <a:endParaRPr b="1" lang="en-US" sz="3200" spc="-1" strike="noStrike">
-              <a:solidFill>
-                <a:srgbClr val="ffffff"/>
-              </a:solidFill>
-              <a:latin typeface="Source Sans Pro Black"/>
-            </a:endParaRPr>
-          </a:p>
-        </p:txBody>
-      </p:sp>
-      <p:sp>
-        <p:nvSpPr>
-          <p:cNvPr id="5" name="PlaceHolder 6"/>
-          <p:cNvSpPr>
-            <a:spLocks noGrp="1"/>
-          </p:cNvSpPr>
-          <p:nvPr>
-            <p:ph type="body"/>
-          </p:nvPr>
-        </p:nvSpPr>
-        <p:spPr>
-          <a:xfrm>
-            <a:off x="360000" y="1980000"/>
-            <a:ext cx="9180000" cy="4680000"/>
-          </a:xfrm>
-          <a:prstGeom prst="rect">
-            <a:avLst/>
-          </a:prstGeom>
-        </p:spPr>
-        <p:txBody>
-          <a:bodyPr lIns="0" rIns="0" tIns="0" bIns="0">
-            <a:normAutofit/>
-          </a:bodyPr>
-          <a:p>
-            <a:pPr>
-              <a:spcAft>
-                <a:spcPts val="1142"/>
-              </a:spcAft>
+            <a:endParaRPr b="0" lang="en-US" sz="1800" spc="-1" strike="noStrike">
+              <a:latin typeface="Arial"/>
+            </a:endParaRPr>
+          </a:p>
+        </p:txBody>
+      </p:sp>
+      <p:sp>
+        <p:nvSpPr>
+          <p:cNvPr id="2" name="PlaceHolder 3"/>
+          <p:cNvSpPr>
+            <a:spLocks noGrp="1"/>
+          </p:cNvSpPr>
+          <p:nvPr>
+            <p:ph type="body"/>
+          </p:nvPr>
+        </p:nvSpPr>
+        <p:spPr>
+          <a:xfrm>
+            <a:off x="504000" y="1768680"/>
+            <a:ext cx="9072000" cy="4384080"/>
+          </a:xfrm>
+          <a:prstGeom prst="rect">
+            <a:avLst/>
+          </a:prstGeom>
+        </p:spPr>
+        <p:txBody>
+          <a:bodyPr lIns="0" rIns="0" tIns="0" bIns="0">
+            <a:normAutofit/>
+          </a:bodyPr>
+          <a:p>
+            <a:pPr marL="432000" indent="-324000">
+              <a:spcBef>
+                <a:spcPts val="1417"/>
+              </a:spcBef>
+              <a:buClr>
+                <a:srgbClr val="000000"/>
+              </a:buClr>
+              <a:buSzPct val="45000"/>
+              <a:buFont typeface="Wingdings" charset="2"/>
+              <a:buChar char=""/>
             </a:pPr>
             <a:r>
-              <a:rPr b="1" lang="en-US" sz="2600" spc="-1" strike="noStrike">
-                <a:solidFill>
-                  <a:srgbClr val="1c1c1c"/>
-                </a:solidFill>
-                <a:latin typeface="Source Sans Pro Semibold"/>
+              <a:rPr b="0" lang="en-US" sz="3200" spc="-1" strike="noStrike">
+                <a:latin typeface="Arial"/>
               </a:rPr>
               <a:t>Click to edit the outline text format</a:t>
             </a:r>
-            <a:endParaRPr b="1" lang="en-US" sz="2600" spc="-1" strike="noStrike">
-              <a:solidFill>
-                <a:srgbClr val="1c1c1c"/>
-              </a:solidFill>
-              <a:latin typeface="Source Sans Pro Semibold"/>
-            </a:endParaRPr>
-          </a:p>
-          <a:p>
-            <a:pPr lvl="1" marL="288000">
-              <a:spcAft>
+            <a:endParaRPr b="0" lang="en-US" sz="3200" spc="-1" strike="noStrike">
+              <a:latin typeface="Arial"/>
+            </a:endParaRPr>
+          </a:p>
+          <a:p>
+            <a:pPr lvl="1" marL="864000" indent="-324000">
+              <a:spcBef>
                 <a:spcPts val="1134"/>
-              </a:spcAft>
+              </a:spcBef>
+              <a:buClr>
+                <a:srgbClr val="000000"/>
+              </a:buClr>
+              <a:buSzPct val="75000"/>
+              <a:buFont typeface="Symbol" charset="2"/>
+              <a:buChar char=""/>
             </a:pPr>
             <a:r>
-              <a:rPr b="0" lang="en-US" sz="2200" spc="-1" strike="noStrike">
-                <a:solidFill>
-                  <a:srgbClr val="1c1c1c"/>
-                </a:solidFill>
-                <a:latin typeface="Source Sans Pro Light"/>
+              <a:rPr b="0" lang="en-US" sz="2800" spc="-1" strike="noStrike">
+                <a:latin typeface="Arial"/>
               </a:rPr>
               <a:t>Second Outline Level</a:t>
             </a:r>
-            <a:endParaRPr b="0" lang="en-US" sz="2200" spc="-1" strike="noStrike">
-              <a:solidFill>
-                <a:srgbClr val="1c1c1c"/>
-              </a:solidFill>
-              <a:latin typeface="Source Sans Pro Light"/>
-            </a:endParaRPr>
-          </a:p>
-          <a:p>
-            <a:pPr lvl="2" marL="576000">
-              <a:spcAft>
+            <a:endParaRPr b="0" lang="en-US" sz="2800" spc="-1" strike="noStrike">
+              <a:latin typeface="Arial"/>
+            </a:endParaRPr>
+          </a:p>
+          <a:p>
+            <a:pPr lvl="2" marL="1296000" indent="-288000">
+              <a:spcBef>
                 <a:spcPts val="850"/>
-              </a:spcAft>
+              </a:spcBef>
+              <a:buClr>
+                <a:srgbClr val="000000"/>
+              </a:buClr>
+              <a:buSzPct val="45000"/>
+              <a:buFont typeface="Wingdings" charset="2"/>
+              <a:buChar char=""/>
             </a:pPr>
             <a:r>
-              <a:rPr b="0" lang="en-US" sz="1800" spc="-1" strike="noStrike">
-                <a:solidFill>
-                  <a:srgbClr val="1c1c1c"/>
-                </a:solidFill>
-                <a:latin typeface="Source Sans Pro Light"/>
+              <a:rPr b="0" lang="en-US" sz="2400" spc="-1" strike="noStrike">
+                <a:latin typeface="Arial"/>
               </a:rPr>
               <a:t>Third Outline Level</a:t>
             </a:r>
-            <a:endParaRPr b="0" lang="en-US" sz="1800" spc="-1" strike="noStrike">
-              <a:solidFill>
-                <a:srgbClr val="1c1c1c"/>
-              </a:solidFill>
-              <a:latin typeface="Source Sans Pro Light"/>
-            </a:endParaRPr>
-          </a:p>
-          <a:p>
-            <a:pPr lvl="3" marL="864000">
-              <a:spcAft>
+            <a:endParaRPr b="0" lang="en-US" sz="2400" spc="-1" strike="noStrike">
+              <a:latin typeface="Arial"/>
+            </a:endParaRPr>
+          </a:p>
+          <a:p>
+            <a:pPr lvl="3" marL="1728000" indent="-216000">
+              <a:spcBef>
                 <a:spcPts val="567"/>
-              </a:spcAft>
+              </a:spcBef>
+              <a:buClr>
+                <a:srgbClr val="000000"/>
+              </a:buClr>
+              <a:buSzPct val="75000"/>
+              <a:buFont typeface="Symbol" charset="2"/>
+              <a:buChar char=""/>
             </a:pPr>
             <a:r>
-              <a:rPr b="0" lang="en-US" sz="1600" spc="-1" strike="noStrike">
-                <a:solidFill>
-                  <a:srgbClr val="1c1c1c"/>
-                </a:solidFill>
-                <a:latin typeface="Source Sans Pro Light"/>
+              <a:rPr b="0" lang="en-US" sz="2000" spc="-1" strike="noStrike">
+                <a:latin typeface="Arial"/>
               </a:rPr>
               <a:t>Fourth Outline Level</a:t>
             </a:r>
-            <a:endParaRPr b="0" lang="en-US" sz="1600" spc="-1" strike="noStrike">
-              <a:solidFill>
-                <a:srgbClr val="1c1c1c"/>
-              </a:solidFill>
-              <a:latin typeface="Source Sans Pro Light"/>
-            </a:endParaRPr>
-          </a:p>
-          <a:p>
-            <a:pPr lvl="4" marL="1152000">
-              <a:spcAft>
+            <a:endParaRPr b="0" lang="en-US" sz="2000" spc="-1" strike="noStrike">
+              <a:latin typeface="Arial"/>
+            </a:endParaRPr>
+          </a:p>
+          <a:p>
+            <a:pPr lvl="4" marL="2160000" indent="-216000">
+              <a:spcBef>
                 <a:spcPts val="283"/>
-              </a:spcAft>
+              </a:spcBef>
+              <a:buClr>
+                <a:srgbClr val="000000"/>
+              </a:buClr>
+              <a:buSzPct val="45000"/>
+              <a:buFont typeface="Wingdings" charset="2"/>
+              <a:buChar char=""/>
             </a:pPr>
             <a:r>
-              <a:rPr b="0" lang="en-US" sz="1600" spc="-1" strike="noStrike">
-                <a:solidFill>
-                  <a:srgbClr val="1c1c1c"/>
-                </a:solidFill>
-                <a:latin typeface="Source Sans Pro Light"/>
+              <a:rPr b="0" lang="en-US" sz="2000" spc="-1" strike="noStrike">
+                <a:latin typeface="Arial"/>
               </a:rPr>
               <a:t>Fifth Outline Level</a:t>
             </a:r>
-            <a:endParaRPr b="0" lang="en-US" sz="1600" spc="-1" strike="noStrike">
-              <a:solidFill>
-                <a:srgbClr val="1c1c1c"/>
-              </a:solidFill>
-              <a:latin typeface="Source Sans Pro Light"/>
-            </a:endParaRPr>
-          </a:p>
-          <a:p>
-            <a:pPr lvl="5" marL="1440000">
-              <a:spcAft>
+            <a:endParaRPr b="0" lang="en-US" sz="2000" spc="-1" strike="noStrike">
+              <a:latin typeface="Arial"/>
+            </a:endParaRPr>
+          </a:p>
+          <a:p>
+            <a:pPr lvl="5" marL="2592000" indent="-216000">
+              <a:spcBef>
                 <a:spcPts val="283"/>
-              </a:spcAft>
+              </a:spcBef>
+              <a:buClr>
+                <a:srgbClr val="000000"/>
+              </a:buClr>
+              <a:buSzPct val="45000"/>
+              <a:buFont typeface="Wingdings" charset="2"/>
+              <a:buChar char=""/>
             </a:pPr>
             <a:r>
-              <a:rPr b="0" lang="en-US" sz="1600" spc="-1" strike="noStrike">
-                <a:solidFill>
-                  <a:srgbClr val="1c1c1c"/>
-                </a:solidFill>
-                <a:latin typeface="Source Sans Pro Light"/>
+              <a:rPr b="0" lang="en-US" sz="2000" spc="-1" strike="noStrike">
+                <a:latin typeface="Arial"/>
               </a:rPr>
               <a:t>Sixth Outline Level</a:t>
             </a:r>
-            <a:endParaRPr b="0" lang="en-US" sz="1600" spc="-1" strike="noStrike">
-              <a:solidFill>
-                <a:srgbClr val="1c1c1c"/>
-              </a:solidFill>
-              <a:latin typeface="Source Sans Pro Light"/>
-            </a:endParaRPr>
-          </a:p>
-          <a:p>
-            <a:pPr lvl="6" marL="1728000">
-              <a:spcAft>
+            <a:endParaRPr b="0" lang="en-US" sz="2000" spc="-1" strike="noStrike">
+              <a:latin typeface="Arial"/>
+            </a:endParaRPr>
+          </a:p>
+          <a:p>
+            <a:pPr lvl="6" marL="3024000" indent="-216000">
+              <a:spcBef>
                 <a:spcPts val="283"/>
-              </a:spcAft>
+              </a:spcBef>
+              <a:buClr>
+                <a:srgbClr val="000000"/>
+              </a:buClr>
+              <a:buSzPct val="45000"/>
+              <a:buFont typeface="Wingdings" charset="2"/>
+              <a:buChar char=""/>
             </a:pPr>
             <a:r>
-              <a:rPr b="0" lang="en-US" sz="1600" spc="-1" strike="noStrike">
-                <a:solidFill>
-                  <a:srgbClr val="1c1c1c"/>
-                </a:solidFill>
-                <a:latin typeface="Source Sans Pro Light"/>
+              <a:rPr b="0" lang="en-US" sz="2000" spc="-1" strike="noStrike">
+                <a:latin typeface="Arial"/>
               </a:rPr>
               <a:t>Seventh Outline Level</a:t>
             </a:r>
-            <a:endParaRPr b="0" lang="en-US" sz="1600" spc="-1" strike="noStrike">
-              <a:solidFill>
-                <a:srgbClr val="1c1c1c"/>
-              </a:solidFill>
-              <a:latin typeface="Source Sans Pro Light"/>
-            </a:endParaRPr>
-          </a:p>
-        </p:txBody>
-      </p:sp>
-      <p:sp>
-        <p:nvSpPr>
-          <p:cNvPr id="6" name="PlaceHolder 7"/>
-          <p:cNvSpPr>
-            <a:spLocks noGrp="1"/>
-          </p:cNvSpPr>
-          <p:nvPr>
-            <p:ph type="dt"/>
-          </p:nvPr>
-        </p:nvSpPr>
-        <p:spPr>
-          <a:xfrm>
-            <a:off x="7560000" y="6840000"/>
-            <a:ext cx="2340000" cy="521640"/>
-          </a:xfrm>
-          <a:prstGeom prst="rect">
-            <a:avLst/>
-          </a:prstGeom>
-        </p:spPr>
-        <p:txBody>
-          <a:bodyPr lIns="0" rIns="0" tIns="0" bIns="0" anchor="ctr"/>
-          <a:p>
-            <a:pPr algn="r"/>
-            <a:r>
-              <a:rPr b="1" lang="en-US" sz="1800" spc="-1" strike="noStrike">
-                <a:solidFill>
-                  <a:srgbClr val="ffffff"/>
-                </a:solidFill>
-                <a:latin typeface="Source Sans Pro Black"/>
-              </a:rPr>
-              <a:t>&lt;date/time&gt;</a:t>
-            </a:r>
-            <a:endParaRPr b="1" lang="en-US" sz="1800" spc="-1" strike="noStrike">
-              <a:solidFill>
-                <a:srgbClr val="ffffff"/>
-              </a:solidFill>
-              <a:latin typeface="Source Sans Pro Black"/>
-            </a:endParaRPr>
-          </a:p>
-        </p:txBody>
-      </p:sp>
-      <p:sp>
-        <p:nvSpPr>
-          <p:cNvPr id="7" name="PlaceHolder 8"/>
-          <p:cNvSpPr>
-            <a:spLocks noGrp="1"/>
-          </p:cNvSpPr>
-          <p:nvPr>
-            <p:ph type="ftr"/>
-          </p:nvPr>
-        </p:nvSpPr>
-        <p:spPr>
-          <a:xfrm>
-            <a:off x="1080000" y="6840000"/>
-            <a:ext cx="3240000" cy="540000"/>
-          </a:xfrm>
-          <a:prstGeom prst="rect">
-            <a:avLst/>
-          </a:prstGeom>
-        </p:spPr>
-        <p:txBody>
-          <a:bodyPr lIns="0" rIns="0" tIns="0" bIns="0" anchor="ctr"/>
-          <a:p>
-            <a:pPr algn="ctr"/>
-            <a:r>
-              <a:rPr b="1" lang="en-US" sz="1800" spc="-1" strike="noStrike">
-                <a:solidFill>
-                  <a:srgbClr val="ffffff"/>
-                </a:solidFill>
-                <a:latin typeface="Source Sans Pro Black"/>
-              </a:rPr>
-              <a:t>&lt;footer&gt;</a:t>
-            </a:r>
-            <a:endParaRPr b="1" lang="en-US" sz="1800" spc="-1" strike="noStrike">
-              <a:solidFill>
-                <a:srgbClr val="ffffff"/>
-              </a:solidFill>
-              <a:latin typeface="Source Sans Pro Black"/>
-            </a:endParaRPr>
-          </a:p>
-        </p:txBody>
-      </p:sp>
-      <p:sp>
-        <p:nvSpPr>
-          <p:cNvPr id="8" name="PlaceHolder 9"/>
-          <p:cNvSpPr>
-            <a:spLocks noGrp="1"/>
-          </p:cNvSpPr>
-          <p:nvPr>
-            <p:ph type="sldNum"/>
-          </p:nvPr>
-        </p:nvSpPr>
-        <p:spPr>
-          <a:xfrm>
-            <a:off x="180000" y="6840000"/>
-            <a:ext cx="540000" cy="540000"/>
-          </a:xfrm>
-          <a:prstGeom prst="rect">
-            <a:avLst/>
-          </a:prstGeom>
-        </p:spPr>
-        <p:txBody>
-          <a:bodyPr lIns="0" rIns="0" tIns="0" bIns="0" anchor="ctr"/>
-          <a:p>
-            <a:pPr algn="ctr"/>
-            <a:fld id="{69CC9673-61E9-4BDE-8D74-4B206F3B495F}" type="slidenum">
-              <a:rPr b="1" lang="en-US" sz="1800" spc="-1" strike="noStrike">
-                <a:solidFill>
-                  <a:srgbClr val="ffffff"/>
-                </a:solidFill>
-                <a:latin typeface="Source Sans Pro Black"/>
-              </a:rPr>
-              <a:t>&lt;number&gt;</a:t>
-            </a:fld>
-            <a:endParaRPr b="1" lang="en-US" sz="1800" spc="-1" strike="noStrike">
-              <a:solidFill>
-                <a:srgbClr val="ffffff"/>
-              </a:solidFill>
-              <a:latin typeface="Source Sans Pro Black"/>
+            <a:endParaRPr b="0" lang="en-US" sz="2000" spc="-1" strike="noStrike">
+              <a:latin typeface="Arial"/>
             </a:endParaRPr>
           </a:p>
         </p:txBody>
@@ -3405,14 +2975,14 @@
       </p:grpSpPr>
       <p:sp>
         <p:nvSpPr>
-          <p:cNvPr id="45" name="CustomShape 1"/>
+          <p:cNvPr id="39" name="CustomShape 1"/>
           <p:cNvSpPr/>
           <p:nvPr/>
         </p:nvSpPr>
         <p:spPr>
           <a:xfrm>
-            <a:off x="0" y="3150000"/>
-            <a:ext cx="9720000" cy="1260000"/>
+            <a:off x="0" y="180000"/>
+            <a:ext cx="9719640" cy="1259640"/>
           </a:xfrm>
           <a:prstGeom prst="rect">
             <a:avLst/>
@@ -3420,7 +2990,7 @@
           <a:solidFill>
             <a:srgbClr val="e74c3c"/>
           </a:solidFill>
-          <a:ln>
+          <a:ln w="72000">
             <a:noFill/>
           </a:ln>
         </p:spPr>
@@ -3433,7 +3003,89 @@
       </p:sp>
       <p:sp>
         <p:nvSpPr>
-          <p:cNvPr id="46" name="PlaceHolder 2"/>
+          <p:cNvPr id="40" name="CustomShape 2"/>
+          <p:cNvSpPr/>
+          <p:nvPr/>
+        </p:nvSpPr>
+        <p:spPr>
+          <a:xfrm>
+            <a:off x="7560000" y="6840000"/>
+            <a:ext cx="2519640" cy="539640"/>
+          </a:xfrm>
+          <a:prstGeom prst="rect">
+            <a:avLst/>
+          </a:prstGeom>
+          <a:solidFill>
+            <a:srgbClr val="e74c3c"/>
+          </a:solidFill>
+          <a:ln w="72000">
+            <a:noFill/>
+          </a:ln>
+        </p:spPr>
+        <p:style>
+          <a:lnRef idx="0"/>
+          <a:fillRef idx="0"/>
+          <a:effectRef idx="0"/>
+          <a:fontRef idx="minor"/>
+        </p:style>
+      </p:sp>
+      <p:sp>
+        <p:nvSpPr>
+          <p:cNvPr id="41" name="CustomShape 3"/>
+          <p:cNvSpPr/>
+          <p:nvPr/>
+        </p:nvSpPr>
+        <p:spPr>
+          <a:xfrm>
+            <a:off x="900000" y="6840000"/>
+            <a:ext cx="6479640" cy="539640"/>
+          </a:xfrm>
+          <a:prstGeom prst="rect">
+            <a:avLst/>
+          </a:prstGeom>
+          <a:solidFill>
+            <a:srgbClr val="bdc3c7"/>
+          </a:solidFill>
+          <a:ln w="72000">
+            <a:noFill/>
+          </a:ln>
+        </p:spPr>
+        <p:style>
+          <a:lnRef idx="0"/>
+          <a:fillRef idx="0"/>
+          <a:effectRef idx="0"/>
+          <a:fontRef idx="minor"/>
+        </p:style>
+      </p:sp>
+      <p:sp>
+        <p:nvSpPr>
+          <p:cNvPr id="42" name="CustomShape 4"/>
+          <p:cNvSpPr/>
+          <p:nvPr/>
+        </p:nvSpPr>
+        <p:spPr>
+          <a:xfrm>
+            <a:off x="180000" y="6840000"/>
+            <a:ext cx="539640" cy="539640"/>
+          </a:xfrm>
+          <a:prstGeom prst="rect">
+            <a:avLst/>
+          </a:prstGeom>
+          <a:noFill/>
+          <a:ln w="72000">
+            <a:noFill/>
+          </a:ln>
+        </p:spPr>
+        <p:style>
+          <a:lnRef idx="0"/>
+          <a:fillRef idx="0"/>
+          <a:effectRef idx="0"/>
+          <a:fontRef idx="minor"/>
+        </p:style>
+      </p:sp>
+      <p:sp>
+        <p:nvSpPr>
+          <p:cNvPr id="43" name="PlaceHolder 5"/>
           <p:cNvSpPr>
             <a:spLocks noGrp="1"/>
           </p:cNvSpPr>
@@ -3443,8 +3095,8 @@
         </p:nvSpPr>
         <p:spPr>
           <a:xfrm>
-            <a:off x="360000" y="3330000"/>
-            <a:ext cx="9360000" cy="900000"/>
+            <a:off x="360000" y="360000"/>
+            <a:ext cx="9359640" cy="899640"/>
           </a:xfrm>
           <a:prstGeom prst="rect">
             <a:avLst/>
@@ -3454,320 +3106,192 @@
           <a:bodyPr lIns="0" rIns="0" tIns="0" bIns="0" anchor="b"/>
           <a:p>
             <a:r>
-              <a:rPr b="1" lang="en-US" sz="3200" spc="-1" strike="noStrike">
-                <a:solidFill>
-                  <a:srgbClr val="ffffff"/>
-                </a:solidFill>
-                <a:latin typeface="Source Sans Pro Black"/>
+              <a:rPr b="0" lang="en-US" sz="1800" spc="-1" strike="noStrike">
+                <a:latin typeface="Arial"/>
               </a:rPr>
               <a:t>Click to edit the title text format</a:t>
             </a:r>
-            <a:endParaRPr b="1" lang="en-US" sz="3200" spc="-1" strike="noStrike">
-              <a:solidFill>
-                <a:srgbClr val="ffffff"/>
-              </a:solidFill>
-              <a:latin typeface="Source Sans Pro Black"/>
-            </a:endParaRPr>
-          </a:p>
-        </p:txBody>
-      </p:sp>
-      <p:sp>
-        <p:nvSpPr>
-          <p:cNvPr id="47" name="PlaceHolder 3"/>
-          <p:cNvSpPr>
-            <a:spLocks noGrp="1"/>
-          </p:cNvSpPr>
-          <p:nvPr>
-            <p:ph type="body"/>
-          </p:nvPr>
-        </p:nvSpPr>
-        <p:spPr>
-          <a:xfrm>
-            <a:off x="540000" y="4680000"/>
-            <a:ext cx="9180000" cy="2520000"/>
-          </a:xfrm>
-          <a:prstGeom prst="rect">
-            <a:avLst/>
-          </a:prstGeom>
-        </p:spPr>
-        <p:txBody>
-          <a:bodyPr lIns="0" rIns="0" tIns="0" bIns="0">
-            <a:normAutofit/>
-          </a:bodyPr>
-          <a:p>
-            <a:pPr>
-              <a:spcAft>
-                <a:spcPts val="1142"/>
-              </a:spcAft>
+            <a:endParaRPr b="0" lang="en-US" sz="1800" spc="-1" strike="noStrike">
+              <a:latin typeface="Arial"/>
+            </a:endParaRPr>
+          </a:p>
+        </p:txBody>
+      </p:sp>
+      <p:sp>
+        <p:nvSpPr>
+          <p:cNvPr id="44" name="PlaceHolder 6"/>
+          <p:cNvSpPr>
+            <a:spLocks noGrp="1"/>
+          </p:cNvSpPr>
+          <p:nvPr>
+            <p:ph type="body"/>
+          </p:nvPr>
+        </p:nvSpPr>
+        <p:spPr>
+          <a:xfrm>
+            <a:off x="360000" y="1980000"/>
+            <a:ext cx="9179640" cy="4679640"/>
+          </a:xfrm>
+          <a:prstGeom prst="rect">
+            <a:avLst/>
+          </a:prstGeom>
+        </p:spPr>
+        <p:txBody>
+          <a:bodyPr lIns="0" rIns="0" tIns="0" bIns="0">
+            <a:normAutofit/>
+          </a:bodyPr>
+          <a:p>
+            <a:pPr marL="432000" indent="-324000">
+              <a:spcBef>
+                <a:spcPts val="1417"/>
+              </a:spcBef>
+              <a:buClr>
+                <a:srgbClr val="000000"/>
+              </a:buClr>
+              <a:buSzPct val="45000"/>
+              <a:buFont typeface="Wingdings" charset="2"/>
+              <a:buChar char=""/>
             </a:pPr>
             <a:r>
-              <a:rPr b="1" lang="en-US" sz="2600" spc="-1" strike="noStrike">
-                <a:solidFill>
-                  <a:srgbClr val="1c1c1c"/>
-                </a:solidFill>
-                <a:latin typeface="Source Sans Pro Semibold"/>
+              <a:rPr b="0" lang="en-US" sz="1800" spc="-1" strike="noStrike">
+                <a:latin typeface="Arial"/>
               </a:rPr>
               <a:t>Click to edit the outline text format</a:t>
             </a:r>
-            <a:endParaRPr b="1" lang="en-US" sz="2600" spc="-1" strike="noStrike">
-              <a:solidFill>
-                <a:srgbClr val="1c1c1c"/>
-              </a:solidFill>
-              <a:latin typeface="Source Sans Pro Semibold"/>
-            </a:endParaRPr>
-          </a:p>
-          <a:p>
-            <a:pPr lvl="1" marL="288000">
-              <a:spcAft>
-                <a:spcPts val="1131"/>
-              </a:spcAft>
+            <a:endParaRPr b="0" lang="en-US" sz="1800" spc="-1" strike="noStrike">
+              <a:latin typeface="Arial"/>
+            </a:endParaRPr>
+          </a:p>
+          <a:p>
+            <a:pPr lvl="1" marL="864000" indent="-324000">
+              <a:spcBef>
+                <a:spcPts val="1134"/>
+              </a:spcBef>
+              <a:buClr>
+                <a:srgbClr val="000000"/>
+              </a:buClr>
+              <a:buSzPct val="75000"/>
+              <a:buFont typeface="Symbol" charset="2"/>
+              <a:buChar char=""/>
             </a:pPr>
             <a:r>
-              <a:rPr b="0" lang="en-US" sz="2200" spc="-1" strike="noStrike">
-                <a:solidFill>
-                  <a:srgbClr val="1c1c1c"/>
-                </a:solidFill>
-                <a:latin typeface="Source Sans Pro Light"/>
+              <a:rPr b="0" lang="en-US" sz="1800" spc="-1" strike="noStrike">
+                <a:latin typeface="Arial"/>
               </a:rPr>
               <a:t>Second Outline Level</a:t>
             </a:r>
-            <a:endParaRPr b="0" lang="en-US" sz="2200" spc="-1" strike="noStrike">
-              <a:solidFill>
-                <a:srgbClr val="1c1c1c"/>
-              </a:solidFill>
-              <a:latin typeface="Source Sans Pro Light"/>
-            </a:endParaRPr>
-          </a:p>
-          <a:p>
-            <a:pPr lvl="2" marL="576000">
-              <a:spcAft>
+            <a:endParaRPr b="0" lang="en-US" sz="1800" spc="-1" strike="noStrike">
+              <a:latin typeface="Arial"/>
+            </a:endParaRPr>
+          </a:p>
+          <a:p>
+            <a:pPr lvl="2" marL="1296000" indent="-288000">
+              <a:spcBef>
                 <a:spcPts val="850"/>
-              </a:spcAft>
+              </a:spcBef>
+              <a:buClr>
+                <a:srgbClr val="000000"/>
+              </a:buClr>
+              <a:buSzPct val="45000"/>
+              <a:buFont typeface="Wingdings" charset="2"/>
+              <a:buChar char=""/>
             </a:pPr>
             <a:r>
               <a:rPr b="0" lang="en-US" sz="1800" spc="-1" strike="noStrike">
-                <a:solidFill>
-                  <a:srgbClr val="1c1c1c"/>
-                </a:solidFill>
-                <a:latin typeface="Source Sans Pro Light"/>
+                <a:latin typeface="Arial"/>
               </a:rPr>
               <a:t>Third Outline Level</a:t>
             </a:r>
             <a:endParaRPr b="0" lang="en-US" sz="1800" spc="-1" strike="noStrike">
-              <a:solidFill>
-                <a:srgbClr val="1c1c1c"/>
-              </a:solidFill>
-              <a:latin typeface="Source Sans Pro Light"/>
-            </a:endParaRPr>
-          </a:p>
-          <a:p>
-            <a:pPr lvl="3" marL="864000">
-              <a:spcAft>
+              <a:latin typeface="Arial"/>
+            </a:endParaRPr>
+          </a:p>
+          <a:p>
+            <a:pPr lvl="3" marL="1728000" indent="-216000">
+              <a:spcBef>
                 <a:spcPts val="567"/>
-              </a:spcAft>
+              </a:spcBef>
+              <a:buClr>
+                <a:srgbClr val="000000"/>
+              </a:buClr>
+              <a:buSzPct val="75000"/>
+              <a:buFont typeface="Symbol" charset="2"/>
+              <a:buChar char=""/>
             </a:pPr>
             <a:r>
-              <a:rPr b="0" lang="en-US" sz="1600" spc="-1" strike="noStrike">
-                <a:solidFill>
-                  <a:srgbClr val="1c1c1c"/>
-                </a:solidFill>
-                <a:latin typeface="Source Sans Pro Light"/>
+              <a:rPr b="0" lang="en-US" sz="1800" spc="-1" strike="noStrike">
+                <a:latin typeface="Arial"/>
               </a:rPr>
               <a:t>Fourth Outline Level</a:t>
             </a:r>
-            <a:endParaRPr b="0" lang="en-US" sz="1600" spc="-1" strike="noStrike">
-              <a:solidFill>
-                <a:srgbClr val="1c1c1c"/>
-              </a:solidFill>
-              <a:latin typeface="Source Sans Pro Light"/>
-            </a:endParaRPr>
-          </a:p>
-          <a:p>
-            <a:pPr lvl="4" marL="1152000">
-              <a:spcAft>
+            <a:endParaRPr b="0" lang="en-US" sz="1800" spc="-1" strike="noStrike">
+              <a:latin typeface="Arial"/>
+            </a:endParaRPr>
+          </a:p>
+          <a:p>
+            <a:pPr lvl="4" marL="2160000" indent="-216000">
+              <a:spcBef>
                 <a:spcPts val="283"/>
-              </a:spcAft>
+              </a:spcBef>
+              <a:buClr>
+                <a:srgbClr val="000000"/>
+              </a:buClr>
+              <a:buSzPct val="45000"/>
+              <a:buFont typeface="Wingdings" charset="2"/>
+              <a:buChar char=""/>
             </a:pPr>
             <a:r>
-              <a:rPr b="0" lang="en-US" sz="1600" spc="-1" strike="noStrike">
-                <a:solidFill>
-                  <a:srgbClr val="1c1c1c"/>
-                </a:solidFill>
-                <a:latin typeface="Source Sans Pro Light"/>
+              <a:rPr b="0" lang="en-US" sz="1800" spc="-1" strike="noStrike">
+                <a:latin typeface="Arial"/>
               </a:rPr>
               <a:t>Fifth Outline Level</a:t>
             </a:r>
-            <a:endParaRPr b="0" lang="en-US" sz="1600" spc="-1" strike="noStrike">
-              <a:solidFill>
-                <a:srgbClr val="1c1c1c"/>
-              </a:solidFill>
-              <a:latin typeface="Source Sans Pro Light"/>
-            </a:endParaRPr>
-          </a:p>
-          <a:p>
-            <a:pPr lvl="5" marL="1440000">
-              <a:spcAft>
+            <a:endParaRPr b="0" lang="en-US" sz="1800" spc="-1" strike="noStrike">
+              <a:latin typeface="Arial"/>
+            </a:endParaRPr>
+          </a:p>
+          <a:p>
+            <a:pPr lvl="5" marL="2592000" indent="-216000">
+              <a:spcBef>
                 <a:spcPts val="283"/>
-              </a:spcAft>
+              </a:spcBef>
+              <a:buClr>
+                <a:srgbClr val="000000"/>
+              </a:buClr>
+              <a:buSzPct val="45000"/>
+              <a:buFont typeface="Wingdings" charset="2"/>
+              <a:buChar char=""/>
             </a:pPr>
             <a:r>
-              <a:rPr b="0" lang="en-US" sz="1600" spc="-1" strike="noStrike">
-                <a:solidFill>
-                  <a:srgbClr val="1c1c1c"/>
-                </a:solidFill>
-                <a:latin typeface="Source Sans Pro Light"/>
+              <a:rPr b="0" lang="en-US" sz="1800" spc="-1" strike="noStrike">
+                <a:latin typeface="Arial"/>
               </a:rPr>
               <a:t>Sixth Outline Level</a:t>
             </a:r>
-            <a:endParaRPr b="0" lang="en-US" sz="1600" spc="-1" strike="noStrike">
-              <a:solidFill>
-                <a:srgbClr val="1c1c1c"/>
-              </a:solidFill>
-              <a:latin typeface="Source Sans Pro Light"/>
-            </a:endParaRPr>
-          </a:p>
-          <a:p>
-            <a:pPr lvl="6" marL="1728000">
-              <a:spcAft>
+            <a:endParaRPr b="0" lang="en-US" sz="1800" spc="-1" strike="noStrike">
+              <a:latin typeface="Arial"/>
+            </a:endParaRPr>
+          </a:p>
+          <a:p>
+            <a:pPr lvl="6" marL="3024000" indent="-216000">
+              <a:spcBef>
                 <a:spcPts val="283"/>
-              </a:spcAft>
+              </a:spcBef>
+              <a:buClr>
+                <a:srgbClr val="000000"/>
+              </a:buClr>
+              <a:buSzPct val="45000"/>
+              <a:buFont typeface="Wingdings" charset="2"/>
+              <a:buChar char=""/>
             </a:pPr>
             <a:r>
-              <a:rPr b="0" lang="en-US" sz="1600" spc="-1" strike="noStrike">
-                <a:solidFill>
-                  <a:srgbClr val="1c1c1c"/>
-                </a:solidFill>
-                <a:latin typeface="Source Sans Pro Light"/>
+              <a:rPr b="0" lang="en-US" sz="1800" spc="-1" strike="noStrike">
+                <a:latin typeface="Arial"/>
               </a:rPr>
               <a:t>Seventh Outline Level</a:t>
             </a:r>
-            <a:endParaRPr b="0" lang="en-US" sz="1600" spc="-1" strike="noStrike">
-              <a:solidFill>
-                <a:srgbClr val="1c1c1c"/>
-              </a:solidFill>
-              <a:latin typeface="Source Sans Pro Light"/>
-            </a:endParaRPr>
-          </a:p>
-        </p:txBody>
-      </p:sp>
-      <p:sp>
-        <p:nvSpPr>
-          <p:cNvPr id="48" name="PlaceHolder 4"/>
-          <p:cNvSpPr>
-            <a:spLocks noGrp="1"/>
-          </p:cNvSpPr>
-          <p:nvPr>
-            <p:ph type="dt"/>
-          </p:nvPr>
-        </p:nvSpPr>
-        <p:spPr>
-          <a:xfrm>
-            <a:off x="7560000" y="6840000"/>
-            <a:ext cx="2340000" cy="540000"/>
-          </a:xfrm>
-          <a:prstGeom prst="rect">
-            <a:avLst/>
-          </a:prstGeom>
-        </p:spPr>
-        <p:txBody>
-          <a:bodyPr lIns="0" rIns="0" tIns="0" bIns="0" anchor="ctr"/>
-          <a:p>
-            <a:r>
-              <a:rPr b="1" lang="en-US" sz="1800" spc="-1" strike="noStrike">
-                <a:solidFill>
-                  <a:srgbClr val="e74c3c"/>
-                </a:solidFill>
-                <a:latin typeface="Source Sans Pro Black"/>
-              </a:rPr>
-              <a:t> </a:t>
-            </a:r>
-            <a:endParaRPr b="1" lang="en-US" sz="1800" spc="-1" strike="noStrike">
-              <a:solidFill>
-                <a:srgbClr val="e74c3c"/>
-              </a:solidFill>
-              <a:latin typeface="Source Sans Pro Black"/>
-            </a:endParaRPr>
-          </a:p>
-        </p:txBody>
-      </p:sp>
-      <p:sp>
-        <p:nvSpPr>
-          <p:cNvPr id="49" name="PlaceHolder 5"/>
-          <p:cNvSpPr>
-            <a:spLocks noGrp="1"/>
-          </p:cNvSpPr>
-          <p:nvPr>
-            <p:ph type="ftr"/>
-          </p:nvPr>
-        </p:nvSpPr>
-        <p:spPr>
-          <a:xfrm>
-            <a:off x="1080000" y="6840000"/>
-            <a:ext cx="3240000" cy="540000"/>
-          </a:xfrm>
-          <a:prstGeom prst="rect">
-            <a:avLst/>
-          </a:prstGeom>
-        </p:spPr>
-        <p:txBody>
-          <a:bodyPr lIns="0" rIns="0" tIns="0" bIns="0" anchor="ctr"/>
-          <a:p>
-            <a:pPr algn="ctr"/>
-            <a:r>
-              <a:rPr b="1" lang="en-US" sz="1800" spc="-1" strike="noStrike">
-                <a:solidFill>
-                  <a:srgbClr val="e74c3c"/>
-                </a:solidFill>
-                <a:latin typeface="Source Sans Pro Black"/>
-              </a:rPr>
-              <a:t> </a:t>
-            </a:r>
-            <a:endParaRPr b="1" lang="en-US" sz="1800" spc="-1" strike="noStrike">
-              <a:solidFill>
-                <a:srgbClr val="e74c3c"/>
-              </a:solidFill>
-              <a:latin typeface="Source Sans Pro Black"/>
-            </a:endParaRPr>
-          </a:p>
-        </p:txBody>
-      </p:sp>
-      <p:sp>
-        <p:nvSpPr>
-          <p:cNvPr id="50" name="PlaceHolder 6"/>
-          <p:cNvSpPr>
-            <a:spLocks noGrp="1"/>
-          </p:cNvSpPr>
-          <p:nvPr>
-            <p:ph type="sldNum"/>
-          </p:nvPr>
-        </p:nvSpPr>
-        <p:spPr>
-          <a:xfrm>
-            <a:off x="180000" y="6840000"/>
-            <a:ext cx="540000" cy="540000"/>
-          </a:xfrm>
-          <a:prstGeom prst="rect">
-            <a:avLst/>
-          </a:prstGeom>
-        </p:spPr>
-        <p:txBody>
-          <a:bodyPr lIns="0" rIns="0" tIns="0" bIns="0"/>
-          <a:p>
-            <a:pPr algn="r"/>
-            <a:fld id="{2C8E4762-0938-4600-AE5A-8CCC70C1152F}" type="slidenum">
-              <a:rPr b="1" lang="en-US" sz="1800" spc="-1" strike="noStrike">
-                <a:solidFill>
-                  <a:srgbClr val="e74c3c"/>
-                </a:solidFill>
-                <a:latin typeface="Source Sans Pro Black"/>
-              </a:rPr>
-              <a:t>1</a:t>
-            </a:fld>
-            <a:endParaRPr b="1" lang="en-US" sz="1800" spc="-1" strike="noStrike">
-              <a:solidFill>
-                <a:srgbClr val="e74c3c"/>
-              </a:solidFill>
-              <a:latin typeface="Source Sans Pro Black"/>
+            <a:endParaRPr b="0" lang="en-US" sz="1800" spc="-1" strike="noStrike">
+              <a:latin typeface="Arial"/>
             </a:endParaRPr>
           </a:p>
         </p:txBody>
@@ -3811,14 +3335,14 @@
       </p:grpSpPr>
       <p:sp>
         <p:nvSpPr>
-          <p:cNvPr id="87" name="TextShape 1"/>
-          <p:cNvSpPr txBox="1"/>
+          <p:cNvPr id="81" name="CustomShape 1"/>
+          <p:cNvSpPr/>
           <p:nvPr/>
         </p:nvSpPr>
         <p:spPr>
           <a:xfrm>
             <a:off x="360000" y="3330000"/>
-            <a:ext cx="9360000" cy="900000"/>
+            <a:ext cx="9359640" cy="899640"/>
           </a:xfrm>
           <a:prstGeom prst="rect">
             <a:avLst/>
@@ -3828,10 +3352,20 @@
             <a:noFill/>
           </a:ln>
         </p:spPr>
+        <p:style>
+          <a:lnRef idx="0"/>
+          <a:fillRef idx="0"/>
+          <a:effectRef idx="0"/>
+          <a:fontRef idx="minor"/>
+        </p:style>
         <p:txBody>
           <a:bodyPr lIns="0" rIns="0" tIns="0" bIns="0" anchor="b"/>
           <a:p>
-            <a:pPr algn="r"/>
+            <a:pPr algn="ctr">
+              <a:lnSpc>
+                <a:spcPct val="100000"/>
+              </a:lnSpc>
+            </a:pPr>
             <a:r>
               <a:rPr b="1" lang="en-US" sz="3200" spc="-1" strike="noStrike">
                 <a:solidFill>
@@ -3841,25 +3375,22 @@
               </a:rPr>
               <a:t>Voabulary by Association</a:t>
             </a:r>
-            <a:endParaRPr b="1" lang="en-US" sz="3200" spc="-1" strike="noStrike">
-              <a:solidFill>
-                <a:srgbClr val="ffffff"/>
-              </a:solidFill>
-              <a:latin typeface="Amiri"/>
-            </a:endParaRPr>
-          </a:p>
-        </p:txBody>
-      </p:sp>
-      <p:sp>
-        <p:nvSpPr>
-          <p:cNvPr id="88" name="TextShape 2"/>
-          <p:cNvSpPr txBox="1"/>
+            <a:endParaRPr b="0" lang="en-US" sz="3200" spc="-1" strike="noStrike">
+              <a:latin typeface="Arial"/>
+            </a:endParaRPr>
+          </a:p>
+        </p:txBody>
+      </p:sp>
+      <p:sp>
+        <p:nvSpPr>
+          <p:cNvPr id="82" name="CustomShape 2"/>
+          <p:cNvSpPr/>
           <p:nvPr/>
         </p:nvSpPr>
         <p:spPr>
           <a:xfrm>
             <a:off x="540000" y="4680000"/>
-            <a:ext cx="9180000" cy="2520000"/>
+            <a:ext cx="9179640" cy="2519640"/>
           </a:xfrm>
           <a:prstGeom prst="rect">
             <a:avLst/>
@@ -3869,9 +3400,20 @@
             <a:noFill/>
           </a:ln>
         </p:spPr>
+        <p:style>
+          <a:lnRef idx="0"/>
+          <a:fillRef idx="0"/>
+          <a:effectRef idx="0"/>
+          <a:fontRef idx="minor"/>
+        </p:style>
         <p:txBody>
           <a:bodyPr lIns="0" rIns="0" tIns="0" bIns="0"/>
           <a:p>
+            <a:pPr algn="ctr">
+              <a:lnSpc>
+                <a:spcPct val="100000"/>
+              </a:lnSpc>
+            </a:pPr>
             <a:r>
               <a:rPr b="0" lang="en-US" sz="2200" spc="-1" strike="noStrike">
                 <a:solidFill>
@@ -3882,10 +3424,7 @@
               <a:t>Kumar Vishal</a:t>
             </a:r>
             <a:endParaRPr b="0" lang="en-US" sz="2200" spc="-1" strike="noStrike">
-              <a:solidFill>
-                <a:srgbClr val="1c1c1c"/>
-              </a:solidFill>
-              <a:latin typeface="Source Sans Pro Light"/>
+              <a:latin typeface="Arial"/>
             </a:endParaRPr>
           </a:p>
         </p:txBody>
@@ -3941,14 +3480,14 @@
       </p:grpSpPr>
       <p:sp>
         <p:nvSpPr>
-          <p:cNvPr id="89" name="TextShape 1"/>
-          <p:cNvSpPr txBox="1"/>
+          <p:cNvPr id="83" name="CustomShape 1"/>
+          <p:cNvSpPr/>
           <p:nvPr/>
         </p:nvSpPr>
         <p:spPr>
           <a:xfrm>
             <a:off x="360000" y="360000"/>
-            <a:ext cx="9360000" cy="900000"/>
+            <a:ext cx="9359640" cy="899640"/>
           </a:xfrm>
           <a:prstGeom prst="rect">
             <a:avLst/>
@@ -3958,9 +3497,20 @@
             <a:noFill/>
           </a:ln>
         </p:spPr>
+        <p:style>
+          <a:lnRef idx="0"/>
+          <a:fillRef idx="0"/>
+          <a:effectRef idx="0"/>
+          <a:fontRef idx="minor"/>
+        </p:style>
         <p:txBody>
           <a:bodyPr lIns="0" rIns="0" tIns="0" bIns="0" anchor="b"/>
           <a:p>
+            <a:pPr>
+              <a:lnSpc>
+                <a:spcPct val="100000"/>
+              </a:lnSpc>
+            </a:pPr>
             <a:r>
               <a:rPr b="1" lang="en-US" sz="2800" spc="-1" strike="noStrike">
                 <a:solidFill>
@@ -3970,25 +3520,22 @@
               </a:rPr>
               <a:t>Incisive(Adj.)</a:t>
             </a:r>
-            <a:endParaRPr b="1" lang="en-US" sz="2800" spc="-1" strike="noStrike">
-              <a:solidFill>
-                <a:srgbClr val="ffffff"/>
-              </a:solidFill>
-              <a:latin typeface="Amiri"/>
-            </a:endParaRPr>
-          </a:p>
-        </p:txBody>
-      </p:sp>
-      <p:sp>
-        <p:nvSpPr>
-          <p:cNvPr id="90" name="TextShape 2"/>
-          <p:cNvSpPr txBox="1"/>
+            <a:endParaRPr b="0" lang="en-US" sz="2800" spc="-1" strike="noStrike">
+              <a:latin typeface="Arial"/>
+            </a:endParaRPr>
+          </a:p>
+        </p:txBody>
+      </p:sp>
+      <p:sp>
+        <p:nvSpPr>
+          <p:cNvPr id="84" name="CustomShape 2"/>
+          <p:cNvSpPr/>
           <p:nvPr/>
         </p:nvSpPr>
         <p:spPr>
           <a:xfrm>
             <a:off x="360000" y="1812240"/>
-            <a:ext cx="9180000" cy="4680000"/>
+            <a:ext cx="9179640" cy="4679640"/>
           </a:xfrm>
           <a:prstGeom prst="rect">
             <a:avLst/>
@@ -3998,12 +3545,21 @@
             <a:noFill/>
           </a:ln>
         </p:spPr>
+        <p:style>
+          <a:lnRef idx="0"/>
+          <a:fillRef idx="0"/>
+          <a:effectRef idx="0"/>
+          <a:fontRef idx="minor"/>
+        </p:style>
         <p:txBody>
           <a:bodyPr lIns="0" rIns="0" tIns="0" bIns="0">
             <a:normAutofit/>
           </a:bodyPr>
           <a:p>
             <a:pPr>
+              <a:lnSpc>
+                <a:spcPct val="100000"/>
+              </a:lnSpc>
               <a:spcAft>
                 <a:spcPts val="1142"/>
               </a:spcAft>
@@ -4018,14 +3574,14 @@
               <a:t>Meaning:</a:t>
             </a:r>
             <a:endParaRPr b="0" lang="en-US" sz="1800" spc="-1" strike="noStrike">
-              <a:solidFill>
-                <a:srgbClr val="1c1c1c"/>
-              </a:solidFill>
-              <a:latin typeface="Amiri"/>
+              <a:latin typeface="Arial"/>
             </a:endParaRPr>
           </a:p>
           <a:p>
             <a:pPr>
+              <a:lnSpc>
+                <a:spcPct val="100000"/>
+              </a:lnSpc>
               <a:spcAft>
                 <a:spcPts val="1142"/>
               </a:spcAft>
@@ -4040,14 +3596,14 @@
               <a:t>1. Showing clear thought and good understanding of what is important, and the ability to express this.</a:t>
             </a:r>
             <a:endParaRPr b="0" lang="en-US" sz="1800" spc="-1" strike="noStrike">
-              <a:solidFill>
-                <a:srgbClr val="1c1c1c"/>
-              </a:solidFill>
-              <a:latin typeface="Amiri"/>
+              <a:latin typeface="Arial"/>
             </a:endParaRPr>
           </a:p>
           <a:p>
             <a:pPr>
+              <a:lnSpc>
+                <a:spcPct val="100000"/>
+              </a:lnSpc>
               <a:spcAft>
                 <a:spcPts val="1142"/>
               </a:spcAft>
@@ -4062,17 +3618,14 @@
               <a:t>2. Showing somebody’s ability to take decisions and act with force.</a:t>
             </a:r>
             <a:endParaRPr b="0" lang="en-US" sz="1800" spc="-1" strike="noStrike">
-              <a:solidFill>
-                <a:srgbClr val="1c1c1c"/>
-              </a:solidFill>
-              <a:latin typeface="Amiri"/>
+              <a:latin typeface="Arial"/>
             </a:endParaRPr>
           </a:p>
         </p:txBody>
       </p:sp>
       <p:pic>
         <p:nvPicPr>
-          <p:cNvPr id="91" name="" descr=""/>
+          <p:cNvPr id="85" name="" descr=""/>
           <p:cNvPicPr/>
           <p:nvPr/>
         </p:nvPicPr>
@@ -4083,7 +3636,7 @@
         <p:spPr>
           <a:xfrm>
             <a:off x="549000" y="3749040"/>
-            <a:ext cx="3748680" cy="2834640"/>
+            <a:ext cx="3748320" cy="2834280"/>
           </a:xfrm>
           <a:prstGeom prst="rect">
             <a:avLst/>

</xml_diff>